<commit_message>
Make some updates on the ontology-based models
</commit_message>
<xml_diff>
--- a/docs/presentations/OBI workshop Oct 2011 Philly/WebService.pptx
+++ b/docs/presentations/OBI workshop Oct 2011 Philly/WebService.pptx
@@ -6,7 +6,7 @@
     <p:sldMasterId id="2147483948" r:id="rId2"/>
   </p:sldMasterIdLst>
   <p:notesMasterIdLst>
-    <p:notesMasterId r:id="rId19"/>
+    <p:notesMasterId r:id="rId23"/>
   </p:notesMasterIdLst>
   <p:sldIdLst>
     <p:sldId id="256" r:id="rId3"/>
@@ -17,14 +17,18 @@
     <p:sldId id="287" r:id="rId8"/>
     <p:sldId id="267" r:id="rId9"/>
     <p:sldId id="286" r:id="rId10"/>
-    <p:sldId id="270" r:id="rId11"/>
-    <p:sldId id="290" r:id="rId12"/>
-    <p:sldId id="271" r:id="rId13"/>
-    <p:sldId id="288" r:id="rId14"/>
-    <p:sldId id="272" r:id="rId15"/>
-    <p:sldId id="284" r:id="rId16"/>
-    <p:sldId id="269" r:id="rId17"/>
-    <p:sldId id="289" r:id="rId18"/>
+    <p:sldId id="292" r:id="rId11"/>
+    <p:sldId id="270" r:id="rId12"/>
+    <p:sldId id="290" r:id="rId13"/>
+    <p:sldId id="293" r:id="rId14"/>
+    <p:sldId id="294" r:id="rId15"/>
+    <p:sldId id="271" r:id="rId16"/>
+    <p:sldId id="288" r:id="rId17"/>
+    <p:sldId id="272" r:id="rId18"/>
+    <p:sldId id="284" r:id="rId19"/>
+    <p:sldId id="291" r:id="rId20"/>
+    <p:sldId id="269" r:id="rId21"/>
+    <p:sldId id="289" r:id="rId22"/>
   </p:sldIdLst>
   <p:sldSz cx="9144000" cy="6858000" type="screen4x3"/>
   <p:notesSz cx="6858000" cy="9144000"/>
@@ -241,11 +245,11 @@
           </c:val>
         </c:ser>
         <c:marker val="1"/>
-        <c:axId val="35075968"/>
-        <c:axId val="35082240"/>
+        <c:axId val="33441664"/>
+        <c:axId val="33443840"/>
       </c:lineChart>
       <c:catAx>
-        <c:axId val="35075968"/>
+        <c:axId val="33441664"/>
         <c:scaling>
           <c:orientation val="minMax"/>
         </c:scaling>
@@ -260,14 +264,14 @@
             <a:prstDash val="solid"/>
           </a:ln>
         </c:spPr>
-        <c:crossAx val="35082240"/>
+        <c:crossAx val="33443840"/>
         <c:crosses val="autoZero"/>
         <c:auto val="1"/>
         <c:lblAlgn val="ctr"/>
         <c:lblOffset val="100"/>
       </c:catAx>
       <c:valAx>
-        <c:axId val="35082240"/>
+        <c:axId val="33443840"/>
         <c:scaling>
           <c:orientation val="minMax"/>
         </c:scaling>
@@ -292,7 +296,7 @@
             <a:prstDash val="solid"/>
           </a:ln>
         </c:spPr>
-        <c:crossAx val="35075968"/>
+        <c:crossAx val="33441664"/>
         <c:crosses val="autoZero"/>
         <c:crossBetween val="between"/>
       </c:valAx>
@@ -311,10 +315,10 @@
         <c:manualLayout>
           <c:xMode val="edge"/>
           <c:yMode val="edge"/>
-          <c:x val="0.6659354155847983"/>
+          <c:x val="0.66593541558479885"/>
           <c:y val="0.56864616575898796"/>
-          <c:w val="0.32506677913291815"/>
-          <c:h val="7.8433953897791495E-2"/>
+          <c:w val="0.32506677913291843"/>
+          <c:h val="7.8433953897791536E-2"/>
         </c:manualLayout>
       </c:layout>
       <c:spPr>
@@ -424,16 +428,16 @@
                 <c:formatCode>General</c:formatCode>
                 <c:ptCount val="4"/>
                 <c:pt idx="0">
-                  <c:v>0.33070000000000005</c:v>
+                  <c:v>0.33070000000000016</c:v>
                 </c:pt>
                 <c:pt idx="1">
                   <c:v>0.35770000000000002</c:v>
                 </c:pt>
                 <c:pt idx="2">
-                  <c:v>0.11990000000000001</c:v>
+                  <c:v>0.11990000000000002</c:v>
                 </c:pt>
                 <c:pt idx="3">
-                  <c:v>0.33070000000000005</c:v>
+                  <c:v>0.33070000000000016</c:v>
                 </c:pt>
               </c:numCache>
             </c:numRef>
@@ -504,10 +508,10 @@
                   <c:v>0.2515</c:v>
                 </c:pt>
                 <c:pt idx="1">
-                  <c:v>0.18000000000000002</c:v>
+                  <c:v>0.18000000000000008</c:v>
                 </c:pt>
                 <c:pt idx="2">
-                  <c:v>9.4100000000000017E-2</c:v>
+                  <c:v>9.4100000000000045E-2</c:v>
                 </c:pt>
                 <c:pt idx="3">
                   <c:v>0.2515</c:v>
@@ -517,11 +521,11 @@
           </c:val>
         </c:ser>
         <c:marker val="1"/>
-        <c:axId val="35123584"/>
-        <c:axId val="35125504"/>
+        <c:axId val="33632640"/>
+        <c:axId val="33634560"/>
       </c:lineChart>
       <c:catAx>
-        <c:axId val="35123584"/>
+        <c:axId val="33632640"/>
         <c:scaling>
           <c:orientation val="minMax"/>
         </c:scaling>
@@ -536,14 +540,14 @@
             <a:prstDash val="solid"/>
           </a:ln>
         </c:spPr>
-        <c:crossAx val="35125504"/>
+        <c:crossAx val="33634560"/>
         <c:crosses val="autoZero"/>
         <c:auto val="1"/>
         <c:lblAlgn val="ctr"/>
         <c:lblOffset val="100"/>
       </c:catAx>
       <c:valAx>
-        <c:axId val="35125504"/>
+        <c:axId val="33634560"/>
         <c:scaling>
           <c:orientation val="minMax"/>
         </c:scaling>
@@ -568,7 +572,7 @@
             <a:prstDash val="solid"/>
           </a:ln>
         </c:spPr>
-        <c:crossAx val="35123584"/>
+        <c:crossAx val="33632640"/>
         <c:crosses val="autoZero"/>
         <c:crossBetween val="between"/>
       </c:valAx>
@@ -587,10 +591,10 @@
         <c:manualLayout>
           <c:xMode val="edge"/>
           <c:yMode val="edge"/>
-          <c:x val="0.82061401883588081"/>
-          <c:y val="0.46570055581287634"/>
-          <c:w val="0.17381501345625502"/>
-          <c:h val="0.15686790779558302"/>
+          <c:x val="0.82061401883588103"/>
+          <c:y val="0.46570055581287645"/>
+          <c:w val="0.17381501345625508"/>
+          <c:h val="0.15686790779558304"/>
         </c:manualLayout>
       </c:layout>
       <c:spPr>
@@ -711,7 +715,7 @@
             <a:fld id="{7529D5DD-6BA8-4D5D-A14B-F8359733B242}" type="datetimeFigureOut">
               <a:rPr lang="en-US" smtClean="0"/>
               <a:pPr/>
-              <a:t>9/16/2011</a:t>
+              <a:t>10/4/2011</a:t>
             </a:fld>
             <a:endParaRPr lang="en-US"/>
           </a:p>
@@ -1306,7 +1310,7 @@
             <a:fld id="{408AD87C-5D51-439C-AA56-8571DE7E0252}" type="slidenum">
               <a:rPr lang="en-US" smtClean="0"/>
               <a:pPr/>
-              <a:t>9</a:t>
+              <a:t>10</a:t>
             </a:fld>
             <a:endParaRPr lang="en-US"/>
           </a:p>
@@ -1396,7 +1400,7 @@
             <a:fld id="{408AD87C-5D51-439C-AA56-8571DE7E0252}" type="slidenum">
               <a:rPr lang="en-US" smtClean="0"/>
               <a:pPr/>
-              <a:t>10</a:t>
+              <a:t>11</a:t>
             </a:fld>
             <a:endParaRPr lang="en-US"/>
           </a:p>
@@ -1492,11 +1496,7 @@
             </a:pPr>
             <a:r>
               <a:rPr lang="en-US" baseline="0" dirty="0" smtClean="0"/>
-              <a:t>What components are annotated</a:t>
-            </a:r>
-            <a:r>
-              <a:rPr lang="en-US" baseline="0" dirty="0" smtClean="0"/>
-              <a:t>?</a:t>
+              <a:t>What components are annotated?</a:t>
             </a:r>
           </a:p>
           <a:p>
@@ -1694,7 +1694,7 @@
             <a:fld id="{408AD87C-5D51-439C-AA56-8571DE7E0252}" type="slidenum">
               <a:rPr lang="en-US" smtClean="0"/>
               <a:pPr/>
-              <a:t>13</a:t>
+              <a:t>16</a:t>
             </a:fld>
             <a:endParaRPr lang="en-US"/>
           </a:p>
@@ -1784,7 +1784,7 @@
             <a:fld id="{408AD87C-5D51-439C-AA56-8571DE7E0252}" type="slidenum">
               <a:rPr lang="en-US" smtClean="0"/>
               <a:pPr/>
-              <a:t>15</a:t>
+              <a:t>19</a:t>
             </a:fld>
             <a:endParaRPr lang="en-US"/>
           </a:p>
@@ -1874,7 +1874,7 @@
             <a:fld id="{408AD87C-5D51-439C-AA56-8571DE7E0252}" type="slidenum">
               <a:rPr lang="en-US" smtClean="0"/>
               <a:pPr/>
-              <a:t>16</a:t>
+              <a:t>20</a:t>
             </a:fld>
             <a:endParaRPr lang="en-US"/>
           </a:p>
@@ -2698,7 +2698,7 @@
             <a:fld id="{45100C54-7F41-4D6B-9C82-1B119090B3F1}" type="datetime1">
               <a:rPr lang="en-US" smtClean="0"/>
               <a:pPr/>
-              <a:t>9/16/2011</a:t>
+              <a:t>10/4/2011</a:t>
             </a:fld>
             <a:endParaRPr lang="en-US"/>
           </a:p>
@@ -2897,7 +2897,7 @@
             <a:fld id="{DB592322-E853-4800-AFA6-346956673A1E}" type="datetime1">
               <a:rPr lang="en-US" smtClean="0"/>
               <a:pPr/>
-              <a:t>9/16/2011</a:t>
+              <a:t>10/4/2011</a:t>
             </a:fld>
             <a:endParaRPr lang="en-US"/>
           </a:p>
@@ -3102,7 +3102,7 @@
             <a:fld id="{D99839FB-91BA-424A-A786-539BBBA791AB}" type="datetime1">
               <a:rPr lang="en-US" smtClean="0"/>
               <a:pPr/>
-              <a:t>9/16/2011</a:t>
+              <a:t>10/4/2011</a:t>
             </a:fld>
             <a:endParaRPr lang="en-US"/>
           </a:p>
@@ -4042,7 +4042,7 @@
             <a:fld id="{CED5FBA7-D063-44C9-98F5-A809AFCF82B6}" type="datetime1">
               <a:rPr lang="en-US" smtClean="0"/>
               <a:pPr/>
-              <a:t>9/16/2011</a:t>
+              <a:t>10/4/2011</a:t>
             </a:fld>
             <a:endParaRPr lang="en-US"/>
           </a:p>
@@ -4297,7 +4297,7 @@
             <a:fld id="{1EF6B16D-0F85-4B82-BE37-4375490CF6D7}" type="datetime1">
               <a:rPr lang="en-US" smtClean="0"/>
               <a:pPr/>
-              <a:t>9/16/2011</a:t>
+              <a:t>10/4/2011</a:t>
             </a:fld>
             <a:endParaRPr lang="en-US"/>
           </a:p>
@@ -5120,7 +5120,7 @@
             <a:fld id="{3B8260AA-179E-4904-9260-BD701E7DDCED}" type="datetime1">
               <a:rPr lang="en-US" smtClean="0"/>
               <a:pPr/>
-              <a:t>9/16/2011</a:t>
+              <a:t>10/4/2011</a:t>
             </a:fld>
             <a:endParaRPr lang="en-US"/>
           </a:p>
@@ -5365,7 +5365,7 @@
             <a:fld id="{9461EBDC-2738-4CF1-9EB6-6C6C624FD79D}" type="datetime1">
               <a:rPr lang="en-US" smtClean="0"/>
               <a:pPr/>
-              <a:t>9/16/2011</a:t>
+              <a:t>10/4/2011</a:t>
             </a:fld>
             <a:endParaRPr lang="en-US"/>
           </a:p>
@@ -5711,7 +5711,7 @@
             <a:fld id="{CEB14723-D31B-4FFF-8BF6-DFD5AD4106D8}" type="datetime1">
               <a:rPr lang="en-US" smtClean="0"/>
               <a:pPr/>
-              <a:t>9/16/2011</a:t>
+              <a:t>10/4/2011</a:t>
             </a:fld>
             <a:endParaRPr lang="en-US" dirty="0"/>
           </a:p>
@@ -5810,7 +5810,7 @@
             <a:fld id="{D7BD04E7-DB2C-44E7-8401-7B2EF877F869}" type="datetime1">
               <a:rPr lang="en-US" smtClean="0"/>
               <a:pPr/>
-              <a:t>9/16/2011</a:t>
+              <a:t>10/4/2011</a:t>
             </a:fld>
             <a:endParaRPr lang="en-US"/>
           </a:p>
@@ -6336,7 +6336,7 @@
             <a:fld id="{E2F01EF0-FFD2-40E1-A32F-9B3627208AC4}" type="datetime1">
               <a:rPr lang="en-US" smtClean="0"/>
               <a:pPr/>
-              <a:t>9/16/2011</a:t>
+              <a:t>10/4/2011</a:t>
             </a:fld>
             <a:endParaRPr lang="en-US"/>
           </a:p>
@@ -6856,7 +6856,7 @@
             <a:fld id="{9F223E29-7B2A-4A6E-8B36-121182E850D1}" type="datetime1">
               <a:rPr lang="en-US" smtClean="0"/>
               <a:pPr/>
-              <a:t>9/16/2011</a:t>
+              <a:t>10/4/2011</a:t>
             </a:fld>
             <a:endParaRPr lang="en-US"/>
           </a:p>
@@ -7007,7 +7007,7 @@
             <a:fld id="{B872EAB8-2209-47FA-91CC-26FE4BDD9545}" type="datetime1">
               <a:rPr lang="en-US" smtClean="0"/>
               <a:pPr/>
-              <a:t>9/16/2011</a:t>
+              <a:t>10/4/2011</a:t>
             </a:fld>
             <a:endParaRPr lang="en-US"/>
           </a:p>
@@ -7204,7 +7204,7 @@
             <a:fld id="{86149588-4A1B-466E-9FB2-229BF8175FE7}" type="datetime1">
               <a:rPr lang="en-US" smtClean="0"/>
               <a:pPr/>
-              <a:t>9/16/2011</a:t>
+              <a:t>10/4/2011</a:t>
             </a:fld>
             <a:endParaRPr lang="en-US"/>
           </a:p>
@@ -7388,7 +7388,7 @@
             <a:fld id="{FC141B0C-D275-49C3-9D1B-58FCB6845F5B}" type="datetime1">
               <a:rPr lang="en-US" smtClean="0"/>
               <a:pPr/>
-              <a:t>9/16/2011</a:t>
+              <a:t>10/4/2011</a:t>
             </a:fld>
             <a:endParaRPr lang="en-US"/>
           </a:p>
@@ -7487,7 +7487,7 @@
             <a:fld id="{85DD8449-C5B7-4117-9FE2-2FE3D08E09ED}" type="datetime1">
               <a:rPr lang="en-US" smtClean="0"/>
               <a:pPr/>
-              <a:t>9/16/2011</a:t>
+              <a:t>10/4/2011</a:t>
             </a:fld>
             <a:endParaRPr lang="en-US"/>
           </a:p>
@@ -7659,7 +7659,7 @@
             <a:fld id="{9EB34B4D-D852-47BD-83B8-7C009639CBA3}" type="datetime1">
               <a:rPr lang="en-US" smtClean="0"/>
               <a:pPr/>
-              <a:t>9/16/2011</a:t>
+              <a:t>10/4/2011</a:t>
             </a:fld>
             <a:endParaRPr lang="en-US"/>
           </a:p>
@@ -8138,7 +8138,7 @@
             <a:fld id="{1C28D42E-A5BC-4278-B5EC-5262A60BD963}" type="datetime1">
               <a:rPr lang="en-US" smtClean="0"/>
               <a:pPr/>
-              <a:t>9/16/2011</a:t>
+              <a:t>10/4/2011</a:t>
             </a:fld>
             <a:endParaRPr lang="en-US"/>
           </a:p>
@@ -8747,7 +8747,7 @@
             <a:fld id="{67091ECE-7262-48AC-8C85-D7D9ECDA6C21}" type="datetime1">
               <a:rPr lang="en-US" smtClean="0"/>
               <a:pPr/>
-              <a:t>9/16/2011</a:t>
+              <a:t>10/4/2011</a:t>
             </a:fld>
             <a:endParaRPr lang="en-US"/>
           </a:p>
@@ -9130,7 +9130,7 @@
             <a:fld id="{7BFC9112-EE29-4F8D-AFF9-49DFC76E3425}" type="datetime1">
               <a:rPr lang="en-US" smtClean="0"/>
               <a:pPr/>
-              <a:t>9/16/2011</a:t>
+              <a:t>10/4/2011</a:t>
             </a:fld>
             <a:endParaRPr lang="en-US"/>
           </a:p>
@@ -9552,7 +9552,7 @@
             <a:fld id="{C572EC97-6D8B-4146-AB4C-B95B539EF4A9}" type="datetime1">
               <a:rPr lang="en-US" smtClean="0"/>
               <a:pPr/>
-              <a:t>9/16/2011</a:t>
+              <a:t>10/4/2011</a:t>
             </a:fld>
             <a:endParaRPr lang="en-US"/>
           </a:p>
@@ -10883,7 +10883,7 @@
             <a:fld id="{11E13247-250B-408B-B25F-68FDDD0AC0E6}" type="datetime1">
               <a:rPr lang="en-US" smtClean="0"/>
               <a:pPr/>
-              <a:t>9/16/2011</a:t>
+              <a:t>10/4/2011</a:t>
             </a:fld>
             <a:endParaRPr lang="en-US"/>
           </a:p>
@@ -11975,7 +11975,7 @@
             <a:fld id="{4372B5CF-8BC2-42B1-8441-5C29F094C339}" type="datetime1">
               <a:rPr lang="en-US" smtClean="0"/>
               <a:pPr/>
-              <a:t>9/16/2011</a:t>
+              <a:t>10/4/2011</a:t>
             </a:fld>
             <a:endParaRPr lang="en-US"/>
           </a:p>
@@ -13162,7 +13162,7 @@
             <a:fld id="{850CA24E-6482-40F0-8089-038E94AA59AB}" type="datetime1">
               <a:rPr lang="en-US" smtClean="0"/>
               <a:pPr/>
-              <a:t>9/16/2011</a:t>
+              <a:t>10/4/2011</a:t>
             </a:fld>
             <a:endParaRPr lang="en-US"/>
           </a:p>
@@ -13986,7 +13986,7 @@
             </a:r>
             <a:r>
               <a:rPr lang="en-US" dirty="0" smtClean="0"/>
-              <a:t>‘run BLAST execution’</a:t>
+              <a:t>BLAST web service</a:t>
             </a:r>
             <a:endParaRPr lang="en-US" dirty="0"/>
           </a:p>
@@ -14018,26 +14018,35 @@
       </p:sp>
       <p:pic>
         <p:nvPicPr>
-          <p:cNvPr id="9" name="Picture 8" descr="Blas-run.jpg"/>
+          <p:cNvPr id="2050" name="Picture 2"/>
           <p:cNvPicPr>
-            <a:picLocks noChangeAspect="1"/>
+            <a:picLocks noChangeAspect="1" noChangeArrowheads="1"/>
           </p:cNvPicPr>
           <p:nvPr/>
         </p:nvPicPr>
         <p:blipFill>
-          <a:blip r:embed="rId3" cstate="print"/>
+          <a:blip r:embed="rId3"/>
+          <a:srcRect/>
           <a:stretch>
             <a:fillRect/>
           </a:stretch>
         </p:blipFill>
-        <p:spPr>
+        <p:spPr bwMode="auto">
           <a:xfrm>
-            <a:off x="533400" y="1377536"/>
-            <a:ext cx="8077200" cy="5480464"/>
+            <a:off x="152400" y="1820498"/>
+            <a:ext cx="8610600" cy="4427902"/>
           </a:xfrm>
           <a:prstGeom prst="rect">
             <a:avLst/>
           </a:prstGeom>
+          <a:noFill/>
+          <a:ln w="9525">
+            <a:noFill/>
+            <a:miter lim="800000"/>
+            <a:headEnd/>
+            <a:tailEnd/>
+          </a:ln>
+          <a:effectLst/>
         </p:spPr>
       </p:pic>
     </p:spTree>
@@ -14082,77 +14091,14 @@
             <p:ph type="title"/>
           </p:nvPr>
         </p:nvSpPr>
-        <p:spPr>
-          <a:xfrm>
-            <a:off x="457200" y="274638"/>
-            <a:ext cx="8382000" cy="1143000"/>
-          </a:xfrm>
-        </p:spPr>
+        <p:spPr/>
         <p:txBody>
           <a:bodyPr/>
           <a:lstStyle/>
           <a:p>
             <a:r>
               <a:rPr lang="en-US" dirty="0" smtClean="0"/>
-              <a:t>Terms for Web Services Annotation</a:t>
-            </a:r>
-            <a:endParaRPr lang="en-US" dirty="0"/>
-          </a:p>
-        </p:txBody>
-      </p:sp>
-      <p:sp>
-        <p:nvSpPr>
-          <p:cNvPr id="3" name="Content Placeholder 2"/>
-          <p:cNvSpPr>
-            <a:spLocks noGrp="1"/>
-          </p:cNvSpPr>
-          <p:nvPr>
-            <p:ph sz="quarter" idx="1"/>
-          </p:nvPr>
-        </p:nvSpPr>
-        <p:spPr/>
-        <p:txBody>
-          <a:bodyPr/>
-          <a:lstStyle/>
-          <a:p>
-            <a:r>
-              <a:rPr lang="en-US" dirty="0" smtClean="0"/>
-              <a:t>OBI Tracker</a:t>
-            </a:r>
-          </a:p>
-          <a:p>
-            <a:pPr lvl="1">
-              <a:buNone/>
-            </a:pPr>
-            <a:r>
-              <a:rPr lang="en-US" dirty="0" smtClean="0">
-                <a:hlinkClick r:id="rId2"/>
-              </a:rPr>
-              <a:t>https://sourceforge.net/tracker/?func=detail&amp;aid=3031357&amp;group_id=177891&amp;atid=886178</a:t>
-            </a:r>
-            <a:endParaRPr lang="en-US" dirty="0" smtClean="0"/>
-          </a:p>
-          <a:p>
-            <a:pPr lvl="1">
-              <a:buNone/>
-            </a:pPr>
-            <a:endParaRPr lang="en-US" dirty="0" smtClean="0"/>
-          </a:p>
-          <a:p>
-            <a:r>
-              <a:rPr lang="en-US" dirty="0" smtClean="0"/>
-              <a:t>Terms for web services annotation added into an OWL file which imported obi.owl</a:t>
-            </a:r>
-          </a:p>
-          <a:p>
-            <a:pPr lvl="1">
-              <a:buNone/>
-            </a:pPr>
-            <a:r>
-              <a:rPr lang="en-US" dirty="0" smtClean="0">
-                <a:hlinkClick r:id="rId3"/>
-              </a:rPr>
-              <a:t>http://webprotege.stanford.edu/#OBI</a:t>
+              <a:t>Ontology-based Representation of ‘run BLAST execution’</a:t>
             </a:r>
             <a:endParaRPr lang="en-US" dirty="0"/>
           </a:p>
@@ -14182,6 +14128,39 @@
           </a:p>
         </p:txBody>
       </p:sp>
+      <p:pic>
+        <p:nvPicPr>
+          <p:cNvPr id="3076" name="Picture 4"/>
+          <p:cNvPicPr>
+            <a:picLocks noChangeAspect="1" noChangeArrowheads="1"/>
+          </p:cNvPicPr>
+          <p:nvPr/>
+        </p:nvPicPr>
+        <p:blipFill>
+          <a:blip r:embed="rId3" cstate="print"/>
+          <a:srcRect/>
+          <a:stretch>
+            <a:fillRect/>
+          </a:stretch>
+        </p:blipFill>
+        <p:spPr bwMode="auto">
+          <a:xfrm>
+            <a:off x="998319" y="1524000"/>
+            <a:ext cx="7078881" cy="5181600"/>
+          </a:xfrm>
+          <a:prstGeom prst="rect">
+            <a:avLst/>
+          </a:prstGeom>
+          <a:noFill/>
+          <a:ln w="9525">
+            <a:noFill/>
+            <a:miter lim="800000"/>
+            <a:headEnd/>
+            <a:tailEnd/>
+          </a:ln>
+          <a:effectLst/>
+        </p:spPr>
+      </p:pic>
     </p:spTree>
   </p:cSld>
   <p:clrMapOvr>
@@ -14231,87 +14210,12 @@
           <a:p>
             <a:r>
               <a:rPr lang="en-US" dirty="0" smtClean="0"/>
-              <a:t>Current Progress</a:t>
-            </a:r>
-            <a:endParaRPr lang="en-US" dirty="0"/>
-          </a:p>
-        </p:txBody>
-      </p:sp>
-      <p:sp>
-        <p:nvSpPr>
-          <p:cNvPr id="3" name="Content Placeholder 2"/>
-          <p:cNvSpPr>
-            <a:spLocks noGrp="1"/>
-          </p:cNvSpPr>
-          <p:nvPr>
-            <p:ph sz="quarter" idx="1"/>
-          </p:nvPr>
-        </p:nvSpPr>
-        <p:spPr/>
-        <p:txBody>
-          <a:bodyPr/>
-          <a:lstStyle/>
-          <a:p>
+              <a:t>Ontology-based Representation of </a:t>
+            </a:r>
             <a:r>
               <a:rPr lang="en-US" dirty="0" smtClean="0"/>
-              <a:t>Have~ 100 terms ready to add</a:t>
-            </a:r>
-          </a:p>
-          <a:p>
-            <a:r>
-              <a:rPr lang="en-US" dirty="0" smtClean="0"/>
-              <a:t>Covering annotation of </a:t>
-            </a:r>
-          </a:p>
-          <a:p>
-            <a:pPr lvl="1"/>
-            <a:r>
-              <a:rPr lang="en-US" dirty="0" smtClean="0"/>
-              <a:t>BLAST (</a:t>
-            </a:r>
-            <a:r>
-              <a:rPr lang="en-US" dirty="0" err="1" smtClean="0"/>
-              <a:t>NCBIBlast</a:t>
-            </a:r>
-            <a:r>
-              <a:rPr lang="en-US" dirty="0" smtClean="0"/>
-              <a:t>, </a:t>
-            </a:r>
-            <a:r>
-              <a:rPr lang="en-US" dirty="0" err="1" smtClean="0"/>
-              <a:t>WUBlast</a:t>
-            </a:r>
-            <a:r>
-              <a:rPr lang="en-US" dirty="0" smtClean="0"/>
-              <a:t> , PSI Blast)</a:t>
-            </a:r>
-          </a:p>
-          <a:p>
-            <a:pPr lvl="1"/>
-            <a:r>
-              <a:rPr lang="en-US" dirty="0" err="1" smtClean="0"/>
-              <a:t>Clustal</a:t>
-            </a:r>
-            <a:r>
-              <a:rPr lang="en-US" dirty="0" smtClean="0"/>
-              <a:t> W, T-Coffee</a:t>
-            </a:r>
-          </a:p>
-          <a:p>
-            <a:pPr lvl="1"/>
-            <a:r>
-              <a:rPr lang="en-US" dirty="0" smtClean="0"/>
-              <a:t>Signal P</a:t>
-            </a:r>
-          </a:p>
-          <a:p>
-            <a:pPr lvl="1"/>
-            <a:r>
-              <a:rPr lang="en-US" dirty="0" smtClean="0"/>
-              <a:t>Fetch Batch</a:t>
-            </a:r>
-          </a:p>
-          <a:p>
+              <a:t>‘BLAST analysis’</a:t>
+            </a:r>
             <a:endParaRPr lang="en-US" dirty="0"/>
           </a:p>
         </p:txBody>
@@ -14335,6 +14239,481 @@
               <a:rPr lang="en-US" smtClean="0"/>
               <a:pPr/>
               <a:t>12</a:t>
+            </a:fld>
+            <a:endParaRPr lang="en-US"/>
+          </a:p>
+        </p:txBody>
+      </p:sp>
+      <p:pic>
+        <p:nvPicPr>
+          <p:cNvPr id="4098" name="Picture 2" descr="C:\Documents and Settings\Jie\My Documents\My Cmaps\BlastAnalysis_20111004.jpg"/>
+          <p:cNvPicPr>
+            <a:picLocks noChangeAspect="1" noChangeArrowheads="1"/>
+          </p:cNvPicPr>
+          <p:nvPr/>
+        </p:nvPicPr>
+        <p:blipFill>
+          <a:blip r:embed="rId2" cstate="print"/>
+          <a:srcRect/>
+          <a:stretch>
+            <a:fillRect/>
+          </a:stretch>
+        </p:blipFill>
+        <p:spPr bwMode="auto">
+          <a:xfrm>
+            <a:off x="0" y="1676400"/>
+            <a:ext cx="9124992" cy="4495800"/>
+          </a:xfrm>
+          <a:prstGeom prst="rect">
+            <a:avLst/>
+          </a:prstGeom>
+          <a:noFill/>
+        </p:spPr>
+      </p:pic>
+    </p:spTree>
+  </p:cSld>
+  <p:clrMapOvr>
+    <a:masterClrMapping/>
+  </p:clrMapOvr>
+  <p:timing>
+    <p:tnLst>
+      <p:par>
+        <p:cTn id="1" dur="indefinite" restart="never" nodeType="tmRoot"/>
+      </p:par>
+    </p:tnLst>
+  </p:timing>
+</p:sld>
+</file>
+
+<file path=ppt/slides/slide13.xml><?xml version="1.0" encoding="utf-8"?>
+<p:sld xmlns:a="http://schemas.openxmlformats.org/drawingml/2006/main" xmlns:r="http://schemas.openxmlformats.org/officeDocument/2006/relationships" xmlns:p="http://schemas.openxmlformats.org/presentationml/2006/main">
+  <p:cSld>
+    <p:spTree>
+      <p:nvGrpSpPr>
+        <p:cNvPr id="1" name=""/>
+        <p:cNvGrpSpPr/>
+        <p:nvPr/>
+      </p:nvGrpSpPr>
+      <p:grpSpPr>
+        <a:xfrm>
+          <a:off x="0" y="0"/>
+          <a:ext cx="0" cy="0"/>
+          <a:chOff x="0" y="0"/>
+          <a:chExt cx="0" cy="0"/>
+        </a:xfrm>
+      </p:grpSpPr>
+      <p:sp>
+        <p:nvSpPr>
+          <p:cNvPr id="2" name="Title 1"/>
+          <p:cNvSpPr>
+            <a:spLocks noGrp="1"/>
+          </p:cNvSpPr>
+          <p:nvPr>
+            <p:ph type="title"/>
+          </p:nvPr>
+        </p:nvSpPr>
+        <p:spPr/>
+        <p:txBody>
+          <a:bodyPr/>
+          <a:lstStyle/>
+          <a:p>
+            <a:r>
+              <a:rPr lang="en-US" dirty="0" smtClean="0"/>
+              <a:t>Data transformation</a:t>
+            </a:r>
+            <a:endParaRPr lang="en-US" dirty="0"/>
+          </a:p>
+        </p:txBody>
+      </p:sp>
+      <p:sp>
+        <p:nvSpPr>
+          <p:cNvPr id="3" name="Content Placeholder 2"/>
+          <p:cNvSpPr>
+            <a:spLocks noGrp="1"/>
+          </p:cNvSpPr>
+          <p:nvPr>
+            <p:ph sz="quarter" idx="1"/>
+          </p:nvPr>
+        </p:nvSpPr>
+        <p:spPr>
+          <a:xfrm>
+            <a:off x="457200" y="5867400"/>
+            <a:ext cx="7467600" cy="990600"/>
+          </a:xfrm>
+        </p:spPr>
+        <p:txBody>
+          <a:bodyPr>
+            <a:normAutofit fontScale="92500" lnSpcReduction="20000"/>
+          </a:bodyPr>
+          <a:lstStyle/>
+          <a:p>
+            <a:r>
+              <a:rPr lang="en-US" dirty="0" smtClean="0"/>
+              <a:t>Can we define it as defined class? </a:t>
+            </a:r>
+          </a:p>
+          <a:p>
+            <a:r>
+              <a:rPr lang="en-US" dirty="0" smtClean="0"/>
+              <a:t>Why have both </a:t>
+            </a:r>
+            <a:r>
+              <a:rPr lang="en-US" dirty="0" err="1" smtClean="0"/>
+              <a:t>has_specified_input</a:t>
+            </a:r>
+            <a:r>
+              <a:rPr lang="en-US" dirty="0" smtClean="0"/>
+              <a:t> only and some ‘data item’?</a:t>
+            </a:r>
+            <a:endParaRPr lang="en-US" dirty="0"/>
+          </a:p>
+        </p:txBody>
+      </p:sp>
+      <p:sp>
+        <p:nvSpPr>
+          <p:cNvPr id="4" name="Slide Number Placeholder 3"/>
+          <p:cNvSpPr>
+            <a:spLocks noGrp="1"/>
+          </p:cNvSpPr>
+          <p:nvPr>
+            <p:ph type="sldNum" sz="quarter" idx="15"/>
+          </p:nvPr>
+        </p:nvSpPr>
+        <p:spPr/>
+        <p:txBody>
+          <a:bodyPr/>
+          <a:lstStyle/>
+          <a:p>
+            <a:fld id="{7B4331BB-6433-41ED-874A-4DB7FFCBDAA2}" type="slidenum">
+              <a:rPr lang="en-US" smtClean="0"/>
+              <a:pPr/>
+              <a:t>13</a:t>
+            </a:fld>
+            <a:endParaRPr lang="en-US"/>
+          </a:p>
+        </p:txBody>
+      </p:sp>
+      <p:pic>
+        <p:nvPicPr>
+          <p:cNvPr id="5122" name="Picture 2"/>
+          <p:cNvPicPr>
+            <a:picLocks noChangeAspect="1" noChangeArrowheads="1"/>
+          </p:cNvPicPr>
+          <p:nvPr/>
+        </p:nvPicPr>
+        <p:blipFill>
+          <a:blip r:embed="rId2"/>
+          <a:srcRect/>
+          <a:stretch>
+            <a:fillRect/>
+          </a:stretch>
+        </p:blipFill>
+        <p:spPr bwMode="auto">
+          <a:xfrm>
+            <a:off x="533400" y="1428750"/>
+            <a:ext cx="7400925" cy="4438650"/>
+          </a:xfrm>
+          <a:prstGeom prst="rect">
+            <a:avLst/>
+          </a:prstGeom>
+          <a:noFill/>
+          <a:ln w="9525">
+            <a:noFill/>
+            <a:miter lim="800000"/>
+            <a:headEnd/>
+            <a:tailEnd/>
+          </a:ln>
+          <a:effectLst/>
+        </p:spPr>
+      </p:pic>
+    </p:spTree>
+  </p:cSld>
+  <p:clrMapOvr>
+    <a:masterClrMapping/>
+  </p:clrMapOvr>
+</p:sld>
+</file>
+
+<file path=ppt/slides/slide14.xml><?xml version="1.0" encoding="utf-8"?>
+<p:sld xmlns:a="http://schemas.openxmlformats.org/drawingml/2006/main" xmlns:r="http://schemas.openxmlformats.org/officeDocument/2006/relationships" xmlns:p="http://schemas.openxmlformats.org/presentationml/2006/main">
+  <p:cSld>
+    <p:spTree>
+      <p:nvGrpSpPr>
+        <p:cNvPr id="1" name=""/>
+        <p:cNvGrpSpPr/>
+        <p:nvPr/>
+      </p:nvGrpSpPr>
+      <p:grpSpPr>
+        <a:xfrm>
+          <a:off x="0" y="0"/>
+          <a:ext cx="0" cy="0"/>
+          <a:chOff x="0" y="0"/>
+          <a:chExt cx="0" cy="0"/>
+        </a:xfrm>
+      </p:grpSpPr>
+      <p:sp>
+        <p:nvSpPr>
+          <p:cNvPr id="2" name="Title 1"/>
+          <p:cNvSpPr>
+            <a:spLocks noGrp="1"/>
+          </p:cNvSpPr>
+          <p:nvPr>
+            <p:ph type="title"/>
+          </p:nvPr>
+        </p:nvSpPr>
+        <p:spPr>
+          <a:xfrm>
+            <a:off x="457200" y="274638"/>
+            <a:ext cx="8382000" cy="1143000"/>
+          </a:xfrm>
+        </p:spPr>
+        <p:txBody>
+          <a:bodyPr/>
+          <a:lstStyle/>
+          <a:p>
+            <a:r>
+              <a:rPr lang="en-US" dirty="0" smtClean="0"/>
+              <a:t>Terms for Web Services Annotation</a:t>
+            </a:r>
+            <a:endParaRPr lang="en-US" dirty="0"/>
+          </a:p>
+        </p:txBody>
+      </p:sp>
+      <p:sp>
+        <p:nvSpPr>
+          <p:cNvPr id="3" name="Content Placeholder 2"/>
+          <p:cNvSpPr>
+            <a:spLocks noGrp="1"/>
+          </p:cNvSpPr>
+          <p:nvPr>
+            <p:ph sz="quarter" idx="1"/>
+          </p:nvPr>
+        </p:nvSpPr>
+        <p:spPr/>
+        <p:txBody>
+          <a:bodyPr/>
+          <a:lstStyle/>
+          <a:p>
+            <a:r>
+              <a:rPr lang="en-US" dirty="0" smtClean="0"/>
+              <a:t>OBI Tracker</a:t>
+            </a:r>
+          </a:p>
+          <a:p>
+            <a:pPr lvl="1">
+              <a:buNone/>
+            </a:pPr>
+            <a:r>
+              <a:rPr lang="en-US" dirty="0" smtClean="0">
+                <a:hlinkClick r:id="rId2"/>
+              </a:rPr>
+              <a:t>https://sourceforge.net/tracker/?func=detail&amp;aid=3031357&amp;group_id=177891&amp;atid=886178</a:t>
+            </a:r>
+            <a:endParaRPr lang="en-US" dirty="0" smtClean="0"/>
+          </a:p>
+          <a:p>
+            <a:pPr lvl="1">
+              <a:buNone/>
+            </a:pPr>
+            <a:endParaRPr lang="en-US" dirty="0" smtClean="0"/>
+          </a:p>
+          <a:p>
+            <a:r>
+              <a:rPr lang="en-US" dirty="0" smtClean="0"/>
+              <a:t>Terms for web services annotation added into an OWL file which imported obi.owl</a:t>
+            </a:r>
+          </a:p>
+          <a:p>
+            <a:pPr lvl="1">
+              <a:buNone/>
+            </a:pPr>
+            <a:r>
+              <a:rPr lang="en-US" dirty="0" smtClean="0">
+                <a:hlinkClick r:id="rId3"/>
+              </a:rPr>
+              <a:t>http://webprotege.stanford.edu/#OBI</a:t>
+            </a:r>
+            <a:endParaRPr lang="en-US" dirty="0"/>
+          </a:p>
+        </p:txBody>
+      </p:sp>
+      <p:sp>
+        <p:nvSpPr>
+          <p:cNvPr id="4" name="Slide Number Placeholder 3"/>
+          <p:cNvSpPr>
+            <a:spLocks noGrp="1"/>
+          </p:cNvSpPr>
+          <p:nvPr>
+            <p:ph type="sldNum" sz="quarter" idx="15"/>
+          </p:nvPr>
+        </p:nvSpPr>
+        <p:spPr/>
+        <p:txBody>
+          <a:bodyPr/>
+          <a:lstStyle/>
+          <a:p>
+            <a:fld id="{7B4331BB-6433-41ED-874A-4DB7FFCBDAA2}" type="slidenum">
+              <a:rPr lang="en-US" smtClean="0"/>
+              <a:pPr/>
+              <a:t>14</a:t>
+            </a:fld>
+            <a:endParaRPr lang="en-US"/>
+          </a:p>
+        </p:txBody>
+      </p:sp>
+    </p:spTree>
+  </p:cSld>
+  <p:clrMapOvr>
+    <a:masterClrMapping/>
+  </p:clrMapOvr>
+  <p:timing>
+    <p:tnLst>
+      <p:par>
+        <p:cTn id="1" dur="indefinite" restart="never" nodeType="tmRoot"/>
+      </p:par>
+    </p:tnLst>
+  </p:timing>
+</p:sld>
+</file>
+
+<file path=ppt/slides/slide15.xml><?xml version="1.0" encoding="utf-8"?>
+<p:sld xmlns:a="http://schemas.openxmlformats.org/drawingml/2006/main" xmlns:r="http://schemas.openxmlformats.org/officeDocument/2006/relationships" xmlns:p="http://schemas.openxmlformats.org/presentationml/2006/main">
+  <p:cSld>
+    <p:spTree>
+      <p:nvGrpSpPr>
+        <p:cNvPr id="1" name=""/>
+        <p:cNvGrpSpPr/>
+        <p:nvPr/>
+      </p:nvGrpSpPr>
+      <p:grpSpPr>
+        <a:xfrm>
+          <a:off x="0" y="0"/>
+          <a:ext cx="0" cy="0"/>
+          <a:chOff x="0" y="0"/>
+          <a:chExt cx="0" cy="0"/>
+        </a:xfrm>
+      </p:grpSpPr>
+      <p:sp>
+        <p:nvSpPr>
+          <p:cNvPr id="2" name="Title 1"/>
+          <p:cNvSpPr>
+            <a:spLocks noGrp="1"/>
+          </p:cNvSpPr>
+          <p:nvPr>
+            <p:ph type="title"/>
+          </p:nvPr>
+        </p:nvSpPr>
+        <p:spPr/>
+        <p:txBody>
+          <a:bodyPr/>
+          <a:lstStyle/>
+          <a:p>
+            <a:r>
+              <a:rPr lang="en-US" dirty="0" smtClean="0"/>
+              <a:t>Current Progress</a:t>
+            </a:r>
+            <a:endParaRPr lang="en-US" dirty="0"/>
+          </a:p>
+        </p:txBody>
+      </p:sp>
+      <p:sp>
+        <p:nvSpPr>
+          <p:cNvPr id="3" name="Content Placeholder 2"/>
+          <p:cNvSpPr>
+            <a:spLocks noGrp="1"/>
+          </p:cNvSpPr>
+          <p:nvPr>
+            <p:ph sz="quarter" idx="1"/>
+          </p:nvPr>
+        </p:nvSpPr>
+        <p:spPr/>
+        <p:txBody>
+          <a:bodyPr/>
+          <a:lstStyle/>
+          <a:p>
+            <a:r>
+              <a:rPr lang="en-US" dirty="0" smtClean="0"/>
+              <a:t>Have~ 100 terms ready to add</a:t>
+            </a:r>
+          </a:p>
+          <a:p>
+            <a:r>
+              <a:rPr lang="en-US" dirty="0" smtClean="0"/>
+              <a:t>Covering annotation of </a:t>
+            </a:r>
+          </a:p>
+          <a:p>
+            <a:pPr lvl="1"/>
+            <a:r>
+              <a:rPr lang="en-US" dirty="0" smtClean="0"/>
+              <a:t>BLAST (</a:t>
+            </a:r>
+            <a:r>
+              <a:rPr lang="en-US" dirty="0" err="1" smtClean="0"/>
+              <a:t>NCBIBlast</a:t>
+            </a:r>
+            <a:r>
+              <a:rPr lang="en-US" dirty="0" smtClean="0"/>
+              <a:t>, </a:t>
+            </a:r>
+            <a:r>
+              <a:rPr lang="en-US" dirty="0" err="1" smtClean="0"/>
+              <a:t>WUBlast</a:t>
+            </a:r>
+            <a:r>
+              <a:rPr lang="en-US" dirty="0" smtClean="0"/>
+              <a:t> , PSI Blast)</a:t>
+            </a:r>
+          </a:p>
+          <a:p>
+            <a:pPr lvl="1"/>
+            <a:r>
+              <a:rPr lang="en-US" dirty="0" err="1" smtClean="0"/>
+              <a:t>Clustal</a:t>
+            </a:r>
+            <a:r>
+              <a:rPr lang="en-US" dirty="0" smtClean="0"/>
+              <a:t> W, T-Coffee</a:t>
+            </a:r>
+          </a:p>
+          <a:p>
+            <a:pPr lvl="1"/>
+            <a:r>
+              <a:rPr lang="en-US" dirty="0" smtClean="0"/>
+              <a:t>Signal P</a:t>
+            </a:r>
+          </a:p>
+          <a:p>
+            <a:pPr lvl="1"/>
+            <a:r>
+              <a:rPr lang="en-US" dirty="0" smtClean="0"/>
+              <a:t>Fetch Batch</a:t>
+            </a:r>
+          </a:p>
+          <a:p>
+            <a:endParaRPr lang="en-US" dirty="0"/>
+          </a:p>
+        </p:txBody>
+      </p:sp>
+      <p:sp>
+        <p:nvSpPr>
+          <p:cNvPr id="4" name="Slide Number Placeholder 3"/>
+          <p:cNvSpPr>
+            <a:spLocks noGrp="1"/>
+          </p:cNvSpPr>
+          <p:nvPr>
+            <p:ph type="sldNum" sz="quarter" idx="15"/>
+          </p:nvPr>
+        </p:nvSpPr>
+        <p:spPr/>
+        <p:txBody>
+          <a:bodyPr/>
+          <a:lstStyle/>
+          <a:p>
+            <a:fld id="{7B4331BB-6433-41ED-874A-4DB7FFCBDAA2}" type="slidenum">
+              <a:rPr lang="en-US" smtClean="0"/>
+              <a:pPr/>
+              <a:t>15</a:t>
             </a:fld>
             <a:endParaRPr lang="en-US"/>
           </a:p>
@@ -14363,10 +14742,17 @@
   <p:clrMapOvr>
     <a:masterClrMapping/>
   </p:clrMapOvr>
+  <p:timing>
+    <p:tnLst>
+      <p:par>
+        <p:cTn id="1" dur="indefinite" restart="never" nodeType="tmRoot"/>
+      </p:par>
+    </p:tnLst>
+  </p:timing>
 </p:sld>
 </file>
 
-<file path=ppt/slides/slide13.xml><?xml version="1.0" encoding="utf-8"?>
+<file path=ppt/slides/slide16.xml><?xml version="1.0" encoding="utf-8"?>
 <p:sld xmlns:a="http://schemas.openxmlformats.org/drawingml/2006/main" xmlns:r="http://schemas.openxmlformats.org/officeDocument/2006/relationships" xmlns:p="http://schemas.openxmlformats.org/presentationml/2006/main">
   <p:cSld>
     <p:spTree>
@@ -14400,11 +14786,7 @@
           <a:p>
             <a:r>
               <a:rPr lang="en-US" dirty="0" smtClean="0"/>
-              <a:t>Compare OBI and EDAM in Web Services </a:t>
-            </a:r>
-            <a:r>
-              <a:rPr lang="en-US" dirty="0" smtClean="0"/>
-              <a:t>Suggestion (example: BLAST to </a:t>
+              <a:t>Compare OBI and EDAM in Web Services Suggestion (example: BLAST to </a:t>
             </a:r>
             <a:r>
               <a:rPr lang="en-US" dirty="0" err="1" smtClean="0"/>
@@ -14436,7 +14818,7 @@
             <a:fld id="{7B4331BB-6433-41ED-874A-4DB7FFCBDAA2}" type="slidenum">
               <a:rPr lang="en-US" smtClean="0"/>
               <a:pPr/>
-              <a:t>13</a:t>
+              <a:t>16</a:t>
             </a:fld>
             <a:endParaRPr lang="en-US" dirty="0"/>
           </a:p>
@@ -14682,11 +15064,7 @@
             <a:pPr algn="ctr"/>
             <a:r>
               <a:rPr lang="en-US" sz="1400" dirty="0" smtClean="0"/>
-              <a:t>r</a:t>
-            </a:r>
-            <a:r>
-              <a:rPr lang="en-US" sz="1400" dirty="0" smtClean="0"/>
-              <a:t>un </a:t>
+              <a:t>run </a:t>
             </a:r>
             <a:r>
               <a:rPr lang="en-US" sz="1400" dirty="0" err="1" smtClean="0"/>
@@ -15229,7 +15607,7 @@
 </p:sld>
 </file>
 
-<file path=ppt/slides/slide14.xml><?xml version="1.0" encoding="utf-8"?>
+<file path=ppt/slides/slide17.xml><?xml version="1.0" encoding="utf-8"?>
 <p:sld xmlns:a="http://schemas.openxmlformats.org/drawingml/2006/main" xmlns:r="http://schemas.openxmlformats.org/officeDocument/2006/relationships" xmlns:p="http://schemas.openxmlformats.org/presentationml/2006/main">
   <p:cSld>
     <p:spTree>
@@ -15289,7 +15667,7 @@
             <a:fld id="{7B4331BB-6433-41ED-874A-4DB7FFCBDAA2}" type="slidenum">
               <a:rPr lang="en-US" smtClean="0"/>
               <a:pPr/>
-              <a:t>14</a:t>
+              <a:t>17</a:t>
             </a:fld>
             <a:endParaRPr lang="en-US" dirty="0"/>
           </a:p>
@@ -15310,7 +15688,124 @@
 </p:sld>
 </file>
 
-<file path=ppt/slides/slide15.xml><?xml version="1.0" encoding="utf-8"?>
+<file path=ppt/slides/slide18.xml><?xml version="1.0" encoding="utf-8"?>
+<p:sld xmlns:a="http://schemas.openxmlformats.org/drawingml/2006/main" xmlns:r="http://schemas.openxmlformats.org/officeDocument/2006/relationships" xmlns:p="http://schemas.openxmlformats.org/presentationml/2006/main">
+  <p:cSld>
+    <p:spTree>
+      <p:nvGrpSpPr>
+        <p:cNvPr id="1" name=""/>
+        <p:cNvGrpSpPr/>
+        <p:nvPr/>
+      </p:nvGrpSpPr>
+      <p:grpSpPr>
+        <a:xfrm>
+          <a:off x="0" y="0"/>
+          <a:ext cx="0" cy="0"/>
+          <a:chOff x="0" y="0"/>
+          <a:chExt cx="0" cy="0"/>
+        </a:xfrm>
+      </p:grpSpPr>
+      <p:sp>
+        <p:nvSpPr>
+          <p:cNvPr id="4" name="Title 3"/>
+          <p:cNvSpPr>
+            <a:spLocks noGrp="1"/>
+          </p:cNvSpPr>
+          <p:nvPr>
+            <p:ph type="title"/>
+          </p:nvPr>
+        </p:nvSpPr>
+        <p:spPr/>
+        <p:txBody>
+          <a:bodyPr/>
+          <a:lstStyle/>
+          <a:p>
+            <a:r>
+              <a:rPr lang="en-US" dirty="0" smtClean="0"/>
+              <a:t>Service</a:t>
+            </a:r>
+            <a:endParaRPr lang="en-US" dirty="0"/>
+          </a:p>
+        </p:txBody>
+      </p:sp>
+      <p:sp>
+        <p:nvSpPr>
+          <p:cNvPr id="5" name="Content Placeholder 4"/>
+          <p:cNvSpPr>
+            <a:spLocks noGrp="1"/>
+          </p:cNvSpPr>
+          <p:nvPr>
+            <p:ph sz="quarter" idx="1"/>
+          </p:nvPr>
+        </p:nvSpPr>
+        <p:spPr/>
+        <p:txBody>
+          <a:bodyPr/>
+          <a:lstStyle/>
+          <a:p>
+            <a:r>
+              <a:rPr lang="en-US" dirty="0" smtClean="0"/>
+              <a:t>planned process‘	</a:t>
+            </a:r>
+          </a:p>
+          <a:p>
+            <a:r>
+              <a:rPr lang="en-US" dirty="0" smtClean="0"/>
+              <a:t>(realizes some 'service consumer role') and (realizes some 'service provider role')</a:t>
+            </a:r>
+          </a:p>
+          <a:p>
+            <a:r>
+              <a:rPr lang="en-US" dirty="0" smtClean="0"/>
+              <a:t>Do we need to provide which entity has 'service consumer role‘ and 'service provider role‘ in different service?</a:t>
+            </a:r>
+          </a:p>
+          <a:p>
+            <a:r>
+              <a:rPr lang="en-US" dirty="0" err="1" smtClean="0"/>
+              <a:t>eg</a:t>
+            </a:r>
+            <a:r>
+              <a:rPr lang="en-US" dirty="0" smtClean="0"/>
+              <a:t>. web service</a:t>
+            </a:r>
+            <a:endParaRPr lang="en-US" dirty="0"/>
+          </a:p>
+        </p:txBody>
+      </p:sp>
+      <p:sp>
+        <p:nvSpPr>
+          <p:cNvPr id="3" name="Slide Number Placeholder 2"/>
+          <p:cNvSpPr>
+            <a:spLocks noGrp="1"/>
+          </p:cNvSpPr>
+          <p:nvPr>
+            <p:ph type="sldNum" sz="quarter" idx="15"/>
+          </p:nvPr>
+        </p:nvSpPr>
+        <p:spPr/>
+        <p:txBody>
+          <a:bodyPr/>
+          <a:lstStyle/>
+          <a:p>
+            <a:fld id="{7B4331BB-6433-41ED-874A-4DB7FFCBDAA2}" type="slidenum">
+              <a:rPr lang="en-US" smtClean="0"/>
+              <a:pPr/>
+              <a:t>18</a:t>
+            </a:fld>
+            <a:endParaRPr lang="en-US" dirty="0"/>
+          </a:p>
+        </p:txBody>
+      </p:sp>
+    </p:spTree>
+  </p:cSld>
+  <p:clrMapOvr>
+    <a:masterClrMapping/>
+  </p:clrMapOvr>
+</p:sld>
+</file>
+
+<file path=ppt/slides/slide19.xml><?xml version="1.0" encoding="utf-8"?>
 <p:sld xmlns:a="http://schemas.openxmlformats.org/drawingml/2006/main" xmlns:r="http://schemas.openxmlformats.org/officeDocument/2006/relationships" xmlns:p="http://schemas.openxmlformats.org/presentationml/2006/main">
   <p:cSld>
     <p:spTree>
@@ -15607,7 +16102,7 @@
             <a:fld id="{7B4331BB-6433-41ED-874A-4DB7FFCBDAA2}" type="slidenum">
               <a:rPr lang="en-US" smtClean="0"/>
               <a:pPr/>
-              <a:t>15</a:t>
+              <a:t>19</a:t>
             </a:fld>
             <a:endParaRPr lang="en-US"/>
           </a:p>
@@ -15637,15 +16132,7 @@
           <a:p>
             <a:r>
               <a:rPr lang="en-US" dirty="0" smtClean="0"/>
-              <a:t>EDAM: </a:t>
-            </a:r>
-            <a:r>
-              <a:rPr lang="en-US" dirty="0" smtClean="0"/>
-              <a:t>14</a:t>
-            </a:r>
-            <a:r>
-              <a:rPr lang="en-US" dirty="0" smtClean="0"/>
-              <a:t> terms</a:t>
+              <a:t>EDAM: 14 terms</a:t>
             </a:r>
           </a:p>
           <a:p>
@@ -15672,7 +16159,7 @@
 </p:sld>
 </file>
 
-<file path=ppt/slides/slide16.xml><?xml version="1.0" encoding="utf-8"?>
+<file path=ppt/slides/slide2.xml><?xml version="1.0" encoding="utf-8"?>
 <p:sld xmlns:a="http://schemas.openxmlformats.org/drawingml/2006/main" xmlns:r="http://schemas.openxmlformats.org/officeDocument/2006/relationships" xmlns:p="http://schemas.openxmlformats.org/presentationml/2006/main">
   <p:cSld>
     <p:spTree>
@@ -15699,6 +16186,158 @@
             <p:ph type="title"/>
           </p:nvPr>
         </p:nvSpPr>
+        <p:spPr/>
+        <p:txBody>
+          <a:bodyPr>
+            <a:normAutofit/>
+          </a:bodyPr>
+          <a:lstStyle/>
+          <a:p>
+            <a:r>
+              <a:rPr lang="en-US" dirty="0" smtClean="0"/>
+              <a:t>Background</a:t>
+            </a:r>
+            <a:endParaRPr lang="en-US" dirty="0"/>
+          </a:p>
+        </p:txBody>
+      </p:sp>
+      <p:sp>
+        <p:nvSpPr>
+          <p:cNvPr id="3" name="Content Placeholder 2"/>
+          <p:cNvSpPr>
+            <a:spLocks noGrp="1"/>
+          </p:cNvSpPr>
+          <p:nvPr>
+            <p:ph sz="quarter" idx="1"/>
+          </p:nvPr>
+        </p:nvSpPr>
+        <p:spPr/>
+        <p:txBody>
+          <a:bodyPr/>
+          <a:lstStyle/>
+          <a:p>
+            <a:r>
+              <a:rPr lang="en-US" dirty="0" smtClean="0"/>
+              <a:t>Over 1000 bioinformatics web services</a:t>
+            </a:r>
+          </a:p>
+          <a:p>
+            <a:r>
+              <a:rPr lang="en-US" dirty="0" smtClean="0"/>
+              <a:t>For biological data analysis, typically need more than a single web service</a:t>
+            </a:r>
+          </a:p>
+          <a:p>
+            <a:r>
+              <a:rPr lang="en-US" dirty="0" smtClean="0"/>
+              <a:t>Example:</a:t>
+            </a:r>
+          </a:p>
+          <a:p>
+            <a:pPr lvl="1"/>
+            <a:r>
+              <a:rPr lang="en-US" dirty="0" smtClean="0"/>
+              <a:t>With a given protein sequence, find its evolutionary relationship to other protein sequences</a:t>
+            </a:r>
+          </a:p>
+          <a:p>
+            <a:pPr lvl="1"/>
+            <a:r>
+              <a:rPr lang="en-US" dirty="0" smtClean="0"/>
+              <a:t>Bioinformatics programs that need to be used:</a:t>
+            </a:r>
+          </a:p>
+          <a:p>
+            <a:pPr lvl="2"/>
+            <a:r>
+              <a:rPr lang="en-US" dirty="0" smtClean="0"/>
+              <a:t>BLAST</a:t>
+            </a:r>
+          </a:p>
+          <a:p>
+            <a:pPr lvl="2"/>
+            <a:r>
+              <a:rPr lang="en-US" dirty="0" err="1" smtClean="0"/>
+              <a:t>ClustalW</a:t>
+            </a:r>
+            <a:endParaRPr lang="en-US" dirty="0" smtClean="0"/>
+          </a:p>
+          <a:p>
+            <a:pPr lvl="2"/>
+            <a:r>
+              <a:rPr lang="en-US" dirty="0" err="1" smtClean="0"/>
+              <a:t>Phylip</a:t>
+            </a:r>
+            <a:endParaRPr lang="en-US" dirty="0"/>
+          </a:p>
+        </p:txBody>
+      </p:sp>
+      <p:sp>
+        <p:nvSpPr>
+          <p:cNvPr id="4" name="Slide Number Placeholder 3"/>
+          <p:cNvSpPr>
+            <a:spLocks noGrp="1"/>
+          </p:cNvSpPr>
+          <p:nvPr>
+            <p:ph type="sldNum" sz="quarter" idx="15"/>
+          </p:nvPr>
+        </p:nvSpPr>
+        <p:spPr/>
+        <p:txBody>
+          <a:bodyPr/>
+          <a:lstStyle/>
+          <a:p>
+            <a:fld id="{7B4331BB-6433-41ED-874A-4DB7FFCBDAA2}" type="slidenum">
+              <a:rPr lang="en-US" smtClean="0"/>
+              <a:pPr/>
+              <a:t>2</a:t>
+            </a:fld>
+            <a:endParaRPr lang="en-US"/>
+          </a:p>
+        </p:txBody>
+      </p:sp>
+    </p:spTree>
+  </p:cSld>
+  <p:clrMapOvr>
+    <a:masterClrMapping/>
+  </p:clrMapOvr>
+  <p:timing>
+    <p:tnLst>
+      <p:par>
+        <p:cTn id="1" dur="indefinite" restart="never" nodeType="tmRoot"/>
+      </p:par>
+    </p:tnLst>
+  </p:timing>
+</p:sld>
+</file>
+
+<file path=ppt/slides/slide20.xml><?xml version="1.0" encoding="utf-8"?>
+<p:sld xmlns:a="http://schemas.openxmlformats.org/drawingml/2006/main" xmlns:r="http://schemas.openxmlformats.org/officeDocument/2006/relationships" xmlns:p="http://schemas.openxmlformats.org/presentationml/2006/main">
+  <p:cSld>
+    <p:spTree>
+      <p:nvGrpSpPr>
+        <p:cNvPr id="1" name=""/>
+        <p:cNvGrpSpPr/>
+        <p:nvPr/>
+      </p:nvGrpSpPr>
+      <p:grpSpPr>
+        <a:xfrm>
+          <a:off x="0" y="0"/>
+          <a:ext cx="0" cy="0"/>
+          <a:chOff x="0" y="0"/>
+          <a:chExt cx="0" cy="0"/>
+        </a:xfrm>
+      </p:grpSpPr>
+      <p:sp>
+        <p:nvSpPr>
+          <p:cNvPr id="2" name="Title 1"/>
+          <p:cNvSpPr>
+            <a:spLocks noGrp="1"/>
+          </p:cNvSpPr>
+          <p:nvPr>
+            <p:ph type="title"/>
+          </p:nvPr>
+        </p:nvSpPr>
         <p:spPr>
           <a:xfrm>
             <a:off x="457200" y="76200"/>
@@ -15735,7 +16374,7 @@
             <a:fld id="{7B4331BB-6433-41ED-874A-4DB7FFCBDAA2}" type="slidenum">
               <a:rPr lang="en-US" smtClean="0"/>
               <a:pPr/>
-              <a:t>16</a:t>
+              <a:t>20</a:t>
             </a:fld>
             <a:endParaRPr lang="en-US"/>
           </a:p>
@@ -15999,11 +16638,7 @@
           <a:p>
             <a:r>
               <a:rPr lang="en-US" dirty="0" smtClean="0"/>
-              <a:t>OBI: 28 terms, 25 new </a:t>
-            </a:r>
-            <a:r>
-              <a:rPr lang="en-US" dirty="0" smtClean="0"/>
-              <a:t>terms</a:t>
+              <a:t>OBI: 28 terms, 25 new terms</a:t>
             </a:r>
           </a:p>
           <a:p>
@@ -16012,158 +16647,6 @@
               <a:t>(36 operations, objectives or parameters)</a:t>
             </a:r>
             <a:endParaRPr lang="en-US" dirty="0"/>
-          </a:p>
-        </p:txBody>
-      </p:sp>
-    </p:spTree>
-  </p:cSld>
-  <p:clrMapOvr>
-    <a:masterClrMapping/>
-  </p:clrMapOvr>
-  <p:timing>
-    <p:tnLst>
-      <p:par>
-        <p:cTn id="1" dur="indefinite" restart="never" nodeType="tmRoot"/>
-      </p:par>
-    </p:tnLst>
-  </p:timing>
-</p:sld>
-</file>
-
-<file path=ppt/slides/slide2.xml><?xml version="1.0" encoding="utf-8"?>
-<p:sld xmlns:a="http://schemas.openxmlformats.org/drawingml/2006/main" xmlns:r="http://schemas.openxmlformats.org/officeDocument/2006/relationships" xmlns:p="http://schemas.openxmlformats.org/presentationml/2006/main">
-  <p:cSld>
-    <p:spTree>
-      <p:nvGrpSpPr>
-        <p:cNvPr id="1" name=""/>
-        <p:cNvGrpSpPr/>
-        <p:nvPr/>
-      </p:nvGrpSpPr>
-      <p:grpSpPr>
-        <a:xfrm>
-          <a:off x="0" y="0"/>
-          <a:ext cx="0" cy="0"/>
-          <a:chOff x="0" y="0"/>
-          <a:chExt cx="0" cy="0"/>
-        </a:xfrm>
-      </p:grpSpPr>
-      <p:sp>
-        <p:nvSpPr>
-          <p:cNvPr id="2" name="Title 1"/>
-          <p:cNvSpPr>
-            <a:spLocks noGrp="1"/>
-          </p:cNvSpPr>
-          <p:nvPr>
-            <p:ph type="title"/>
-          </p:nvPr>
-        </p:nvSpPr>
-        <p:spPr/>
-        <p:txBody>
-          <a:bodyPr>
-            <a:normAutofit/>
-          </a:bodyPr>
-          <a:lstStyle/>
-          <a:p>
-            <a:r>
-              <a:rPr lang="en-US" dirty="0" smtClean="0"/>
-              <a:t>Background</a:t>
-            </a:r>
-            <a:endParaRPr lang="en-US" dirty="0"/>
-          </a:p>
-        </p:txBody>
-      </p:sp>
-      <p:sp>
-        <p:nvSpPr>
-          <p:cNvPr id="3" name="Content Placeholder 2"/>
-          <p:cNvSpPr>
-            <a:spLocks noGrp="1"/>
-          </p:cNvSpPr>
-          <p:nvPr>
-            <p:ph sz="quarter" idx="1"/>
-          </p:nvPr>
-        </p:nvSpPr>
-        <p:spPr/>
-        <p:txBody>
-          <a:bodyPr/>
-          <a:lstStyle/>
-          <a:p>
-            <a:r>
-              <a:rPr lang="en-US" dirty="0" smtClean="0"/>
-              <a:t>Over 1000 bioinformatics web services</a:t>
-            </a:r>
-          </a:p>
-          <a:p>
-            <a:r>
-              <a:rPr lang="en-US" dirty="0" smtClean="0"/>
-              <a:t>For biological data analysis, typically need more than a single web service</a:t>
-            </a:r>
-          </a:p>
-          <a:p>
-            <a:r>
-              <a:rPr lang="en-US" dirty="0" smtClean="0"/>
-              <a:t>Example:</a:t>
-            </a:r>
-          </a:p>
-          <a:p>
-            <a:pPr lvl="1"/>
-            <a:r>
-              <a:rPr lang="en-US" dirty="0" smtClean="0"/>
-              <a:t>With a given protein sequence, find its evolutionary relationship to other protein sequences</a:t>
-            </a:r>
-          </a:p>
-          <a:p>
-            <a:pPr lvl="1"/>
-            <a:r>
-              <a:rPr lang="en-US" dirty="0" smtClean="0"/>
-              <a:t>Bioinformatics programs that need to be used:</a:t>
-            </a:r>
-          </a:p>
-          <a:p>
-            <a:pPr lvl="2"/>
-            <a:r>
-              <a:rPr lang="en-US" dirty="0" smtClean="0"/>
-              <a:t>BLAST</a:t>
-            </a:r>
-          </a:p>
-          <a:p>
-            <a:pPr lvl="2"/>
-            <a:r>
-              <a:rPr lang="en-US" dirty="0" err="1" smtClean="0"/>
-              <a:t>ClustalW</a:t>
-            </a:r>
-            <a:endParaRPr lang="en-US" dirty="0" smtClean="0"/>
-          </a:p>
-          <a:p>
-            <a:pPr lvl="2"/>
-            <a:r>
-              <a:rPr lang="en-US" dirty="0" err="1" smtClean="0"/>
-              <a:t>Phylip</a:t>
-            </a:r>
-            <a:endParaRPr lang="en-US" dirty="0"/>
-          </a:p>
-        </p:txBody>
-      </p:sp>
-      <p:sp>
-        <p:nvSpPr>
-          <p:cNvPr id="4" name="Slide Number Placeholder 3"/>
-          <p:cNvSpPr>
-            <a:spLocks noGrp="1"/>
-          </p:cNvSpPr>
-          <p:nvPr>
-            <p:ph type="sldNum" sz="quarter" idx="15"/>
-          </p:nvPr>
-        </p:nvSpPr>
-        <p:spPr/>
-        <p:txBody>
-          <a:bodyPr/>
-          <a:lstStyle/>
-          <a:p>
-            <a:fld id="{7B4331BB-6433-41ED-874A-4DB7FFCBDAA2}" type="slidenum">
-              <a:rPr lang="en-US" smtClean="0"/>
-              <a:pPr/>
-              <a:t>2</a:t>
-            </a:fld>
-            <a:endParaRPr lang="en-US"/>
           </a:p>
         </p:txBody>
       </p:sp>
@@ -17109,26 +17592,35 @@
       </p:sp>
       <p:pic>
         <p:nvPicPr>
-          <p:cNvPr id="5" name="Picture 4" descr="web service.jpg"/>
+          <p:cNvPr id="1026" name="Picture 2"/>
           <p:cNvPicPr>
-            <a:picLocks noChangeAspect="1"/>
+            <a:picLocks noChangeAspect="1" noChangeArrowheads="1"/>
           </p:cNvPicPr>
           <p:nvPr/>
         </p:nvPicPr>
         <p:blipFill>
           <a:blip r:embed="rId2" cstate="print"/>
+          <a:srcRect/>
           <a:stretch>
             <a:fillRect/>
           </a:stretch>
         </p:blipFill>
-        <p:spPr>
+        <p:spPr bwMode="auto">
           <a:xfrm>
-            <a:off x="533400" y="1676400"/>
-            <a:ext cx="7543800" cy="4572000"/>
+            <a:off x="243400" y="1676400"/>
+            <a:ext cx="8367200" cy="4495800"/>
           </a:xfrm>
           <a:prstGeom prst="rect">
             <a:avLst/>
           </a:prstGeom>
+          <a:noFill/>
+          <a:ln w="9525">
+            <a:noFill/>
+            <a:miter lim="800000"/>
+            <a:headEnd/>
+            <a:tailEnd/>
+          </a:ln>
+          <a:effectLst/>
         </p:spPr>
       </p:pic>
     </p:spTree>
@@ -17173,8 +17665,161 @@
           <a:p>
             <a:r>
               <a:rPr lang="en-US" dirty="0" smtClean="0"/>
-              <a:t>Ontology-based Representation of BLAST</a:t>
-            </a:r>
+              <a:t>Definitions of the Terms</a:t>
+            </a:r>
+            <a:endParaRPr lang="en-US" dirty="0"/>
+          </a:p>
+        </p:txBody>
+      </p:sp>
+      <p:sp>
+        <p:nvSpPr>
+          <p:cNvPr id="3" name="Content Placeholder 2"/>
+          <p:cNvSpPr>
+            <a:spLocks noGrp="1"/>
+          </p:cNvSpPr>
+          <p:nvPr>
+            <p:ph sz="quarter" idx="1"/>
+          </p:nvPr>
+        </p:nvSpPr>
+        <p:spPr>
+          <a:xfrm>
+            <a:off x="457200" y="1600200"/>
+            <a:ext cx="7848600" cy="5257800"/>
+          </a:xfrm>
+        </p:spPr>
+        <p:txBody>
+          <a:bodyPr>
+            <a:normAutofit lnSpcReduction="10000"/>
+          </a:bodyPr>
+          <a:lstStyle/>
+          <a:p>
+            <a:r>
+              <a:rPr lang="en-US" b="1" dirty="0" smtClean="0"/>
+              <a:t>Algorithm</a:t>
+            </a:r>
+            <a:r>
+              <a:rPr lang="en-US" dirty="0" smtClean="0"/>
+              <a:t>: a plan specification that contains a set of </a:t>
+            </a:r>
+            <a:r>
+              <a:rPr lang="en-US" dirty="0" smtClean="0"/>
+              <a:t>instructions, </a:t>
+            </a:r>
+            <a:r>
+              <a:rPr lang="en-US" dirty="0" smtClean="0"/>
+              <a:t>independent of implementation </a:t>
+            </a:r>
+            <a:r>
+              <a:rPr lang="en-US" dirty="0" smtClean="0"/>
+              <a:t>and </a:t>
+            </a:r>
+            <a:r>
+              <a:rPr lang="en-US" dirty="0" smtClean="0"/>
+              <a:t>programming </a:t>
+            </a:r>
+            <a:r>
+              <a:rPr lang="en-US" dirty="0" smtClean="0"/>
+              <a:t>languages.</a:t>
+            </a:r>
+          </a:p>
+          <a:p>
+            <a:pPr lvl="1"/>
+            <a:r>
+              <a:rPr lang="en-US" dirty="0" smtClean="0"/>
+              <a:t>Algorithm is encoded in software, like data item is encoded in data format specification</a:t>
+            </a:r>
+          </a:p>
+          <a:p>
+            <a:pPr lvl="1"/>
+            <a:r>
+              <a:rPr lang="en-US" dirty="0" smtClean="0"/>
+              <a:t>Relation: ‘is encoded in’, proposed by Software Ontology</a:t>
+            </a:r>
+          </a:p>
+          <a:p>
+            <a:pPr lvl="1">
+              <a:buNone/>
+            </a:pPr>
+            <a:r>
+              <a:rPr lang="en-US" dirty="0" smtClean="0"/>
+              <a:t>	We </a:t>
+            </a:r>
+            <a:r>
+              <a:rPr lang="en-US" dirty="0" smtClean="0"/>
+              <a:t>propose its reverse relation as ‘</a:t>
+            </a:r>
+            <a:r>
+              <a:rPr lang="en-US" dirty="0" smtClean="0"/>
+              <a:t>encodes</a:t>
+            </a:r>
+            <a:r>
+              <a:rPr lang="en-US" dirty="0" smtClean="0"/>
+              <a:t>’.</a:t>
+            </a:r>
+            <a:r>
+              <a:rPr lang="en-US" dirty="0" smtClean="0"/>
+              <a:t> </a:t>
+            </a:r>
+          </a:p>
+          <a:p>
+            <a:r>
+              <a:rPr lang="en-US" b="1" dirty="0" smtClean="0"/>
+              <a:t>Software</a:t>
+            </a:r>
+            <a:r>
+              <a:rPr lang="en-US" dirty="0" smtClean="0"/>
+              <a:t>: a </a:t>
+            </a:r>
+            <a:r>
+              <a:rPr lang="en-US" dirty="0" smtClean="0"/>
+              <a:t>plan specification that </a:t>
+            </a:r>
+            <a:r>
+              <a:rPr lang="en-US" dirty="0" smtClean="0"/>
+              <a:t>implements (encodes) </a:t>
+            </a:r>
+            <a:r>
+              <a:rPr lang="en-US" dirty="0" smtClean="0"/>
+              <a:t>one or more algorithms in one or more programming languages</a:t>
+            </a:r>
+            <a:r>
+              <a:rPr lang="en-US" dirty="0" smtClean="0"/>
+              <a:t>.</a:t>
+            </a:r>
+          </a:p>
+          <a:p>
+            <a:r>
+              <a:rPr lang="en-US" b="1" dirty="0" smtClean="0"/>
+              <a:t>Software execution</a:t>
+            </a:r>
+            <a:r>
+              <a:rPr lang="en-US" dirty="0" smtClean="0"/>
+              <a:t>: a planned process that executes software. </a:t>
+            </a:r>
+            <a:endParaRPr lang="en-US" dirty="0" smtClean="0"/>
+          </a:p>
+          <a:p>
+            <a:pPr lvl="1"/>
+            <a:r>
+              <a:rPr lang="en-US" dirty="0" smtClean="0"/>
+              <a:t>Relation: ‘is executed in’, proposed by Software Ontology</a:t>
+            </a:r>
+          </a:p>
+          <a:p>
+            <a:pPr lvl="1">
+              <a:buNone/>
+            </a:pPr>
+            <a:r>
+              <a:rPr lang="en-US" dirty="0" smtClean="0"/>
+              <a:t>    We propose its reverse relation as ‘executes’.</a:t>
+            </a:r>
+            <a:r>
+              <a:rPr lang="en-US" dirty="0" smtClean="0"/>
+              <a:t/>
+            </a:r>
+            <a:br>
+              <a:rPr lang="en-US" dirty="0" smtClean="0"/>
+            </a:br>
             <a:endParaRPr lang="en-US" dirty="0"/>
           </a:p>
         </p:txBody>
@@ -17203,42 +17848,11 @@
           </a:p>
         </p:txBody>
       </p:sp>
-      <p:pic>
-        <p:nvPicPr>
-          <p:cNvPr id="6" name="Picture 5" descr="Blast.jpg"/>
-          <p:cNvPicPr>
-            <a:picLocks noChangeAspect="1"/>
-          </p:cNvPicPr>
-          <p:nvPr/>
-        </p:nvPicPr>
-        <p:blipFill>
-          <a:blip r:embed="rId3"/>
-          <a:stretch>
-            <a:fillRect/>
-          </a:stretch>
-        </p:blipFill>
-        <p:spPr>
-          <a:xfrm>
-            <a:off x="609600" y="2095748"/>
-            <a:ext cx="7550366" cy="3619252"/>
-          </a:xfrm>
-          <a:prstGeom prst="rect">
-            <a:avLst/>
-          </a:prstGeom>
-        </p:spPr>
-      </p:pic>
     </p:spTree>
   </p:cSld>
   <p:clrMapOvr>
     <a:masterClrMapping/>
   </p:clrMapOvr>
-  <p:timing>
-    <p:tnLst>
-      <p:par>
-        <p:cTn id="1" dur="indefinite" restart="never" nodeType="tmRoot"/>
-      </p:par>
-    </p:tnLst>
-  </p:timing>
 </p:sld>
 </file>
 

</xml_diff>

<commit_message>
make some minor changes
</commit_message>
<xml_diff>
--- a/docs/presentations/OBI workshop Oct 2011 Philly/WebService.pptx
+++ b/docs/presentations/OBI workshop Oct 2011 Philly/WebService.pptx
@@ -245,11 +245,11 @@
           </c:val>
         </c:ser>
         <c:marker val="1"/>
-        <c:axId val="33441664"/>
-        <c:axId val="33443840"/>
+        <c:axId val="99944320"/>
+        <c:axId val="35828096"/>
       </c:lineChart>
       <c:catAx>
-        <c:axId val="33441664"/>
+        <c:axId val="99944320"/>
         <c:scaling>
           <c:orientation val="minMax"/>
         </c:scaling>
@@ -264,14 +264,14 @@
             <a:prstDash val="solid"/>
           </a:ln>
         </c:spPr>
-        <c:crossAx val="33443840"/>
+        <c:crossAx val="35828096"/>
         <c:crosses val="autoZero"/>
         <c:auto val="1"/>
         <c:lblAlgn val="ctr"/>
         <c:lblOffset val="100"/>
       </c:catAx>
       <c:valAx>
-        <c:axId val="33443840"/>
+        <c:axId val="35828096"/>
         <c:scaling>
           <c:orientation val="minMax"/>
         </c:scaling>
@@ -296,7 +296,7 @@
             <a:prstDash val="solid"/>
           </a:ln>
         </c:spPr>
-        <c:crossAx val="33441664"/>
+        <c:crossAx val="99944320"/>
         <c:crosses val="autoZero"/>
         <c:crossBetween val="between"/>
       </c:valAx>
@@ -315,10 +315,10 @@
         <c:manualLayout>
           <c:xMode val="edge"/>
           <c:yMode val="edge"/>
-          <c:x val="0.66593541558479885"/>
+          <c:x val="0.66593541558479907"/>
           <c:y val="0.56864616575898796"/>
-          <c:w val="0.32506677913291843"/>
-          <c:h val="7.8433953897791536E-2"/>
+          <c:w val="0.32506677913291859"/>
+          <c:h val="7.843395389779155E-2"/>
         </c:manualLayout>
       </c:layout>
       <c:spPr>
@@ -428,7 +428,7 @@
                 <c:formatCode>General</c:formatCode>
                 <c:ptCount val="4"/>
                 <c:pt idx="0">
-                  <c:v>0.33070000000000016</c:v>
+                  <c:v>0.33070000000000022</c:v>
                 </c:pt>
                 <c:pt idx="1">
                   <c:v>0.35770000000000002</c:v>
@@ -437,7 +437,7 @@
                   <c:v>0.11990000000000002</c:v>
                 </c:pt>
                 <c:pt idx="3">
-                  <c:v>0.33070000000000016</c:v>
+                  <c:v>0.33070000000000022</c:v>
                 </c:pt>
               </c:numCache>
             </c:numRef>
@@ -508,7 +508,7 @@
                   <c:v>0.2515</c:v>
                 </c:pt>
                 <c:pt idx="1">
-                  <c:v>0.18000000000000008</c:v>
+                  <c:v>0.1800000000000001</c:v>
                 </c:pt>
                 <c:pt idx="2">
                   <c:v>9.4100000000000045E-2</c:v>
@@ -521,11 +521,11 @@
           </c:val>
         </c:ser>
         <c:marker val="1"/>
-        <c:axId val="33632640"/>
-        <c:axId val="33634560"/>
+        <c:axId val="63848832"/>
+        <c:axId val="63850752"/>
       </c:lineChart>
       <c:catAx>
-        <c:axId val="33632640"/>
+        <c:axId val="63848832"/>
         <c:scaling>
           <c:orientation val="minMax"/>
         </c:scaling>
@@ -540,14 +540,14 @@
             <a:prstDash val="solid"/>
           </a:ln>
         </c:spPr>
-        <c:crossAx val="33634560"/>
+        <c:crossAx val="63850752"/>
         <c:crosses val="autoZero"/>
         <c:auto val="1"/>
         <c:lblAlgn val="ctr"/>
         <c:lblOffset val="100"/>
       </c:catAx>
       <c:valAx>
-        <c:axId val="33634560"/>
+        <c:axId val="63850752"/>
         <c:scaling>
           <c:orientation val="minMax"/>
         </c:scaling>
@@ -572,7 +572,7 @@
             <a:prstDash val="solid"/>
           </a:ln>
         </c:spPr>
-        <c:crossAx val="33632640"/>
+        <c:crossAx val="63848832"/>
         <c:crosses val="autoZero"/>
         <c:crossBetween val="between"/>
       </c:valAx>
@@ -591,9 +591,9 @@
         <c:manualLayout>
           <c:xMode val="edge"/>
           <c:yMode val="edge"/>
-          <c:x val="0.82061401883588103"/>
-          <c:y val="0.46570055581287645"/>
-          <c:w val="0.17381501345625508"/>
+          <c:x val="0.82061401883588114"/>
+          <c:y val="0.4657005558128765"/>
+          <c:w val="0.17381501345625511"/>
           <c:h val="0.15686790779558304"/>
         </c:manualLayout>
       </c:layout>
@@ -715,7 +715,7 @@
             <a:fld id="{7529D5DD-6BA8-4D5D-A14B-F8359733B242}" type="datetimeFigureOut">
               <a:rPr lang="en-US" smtClean="0"/>
               <a:pPr/>
-              <a:t>10/4/2011</a:t>
+              <a:t>10/5/2011</a:t>
             </a:fld>
             <a:endParaRPr lang="en-US"/>
           </a:p>
@@ -2698,7 +2698,7 @@
             <a:fld id="{45100C54-7F41-4D6B-9C82-1B119090B3F1}" type="datetime1">
               <a:rPr lang="en-US" smtClean="0"/>
               <a:pPr/>
-              <a:t>10/4/2011</a:t>
+              <a:t>10/5/2011</a:t>
             </a:fld>
             <a:endParaRPr lang="en-US"/>
           </a:p>
@@ -2897,7 +2897,7 @@
             <a:fld id="{DB592322-E853-4800-AFA6-346956673A1E}" type="datetime1">
               <a:rPr lang="en-US" smtClean="0"/>
               <a:pPr/>
-              <a:t>10/4/2011</a:t>
+              <a:t>10/5/2011</a:t>
             </a:fld>
             <a:endParaRPr lang="en-US"/>
           </a:p>
@@ -3102,7 +3102,7 @@
             <a:fld id="{D99839FB-91BA-424A-A786-539BBBA791AB}" type="datetime1">
               <a:rPr lang="en-US" smtClean="0"/>
               <a:pPr/>
-              <a:t>10/4/2011</a:t>
+              <a:t>10/5/2011</a:t>
             </a:fld>
             <a:endParaRPr lang="en-US"/>
           </a:p>
@@ -4042,7 +4042,7 @@
             <a:fld id="{CED5FBA7-D063-44C9-98F5-A809AFCF82B6}" type="datetime1">
               <a:rPr lang="en-US" smtClean="0"/>
               <a:pPr/>
-              <a:t>10/4/2011</a:t>
+              <a:t>10/5/2011</a:t>
             </a:fld>
             <a:endParaRPr lang="en-US"/>
           </a:p>
@@ -4297,7 +4297,7 @@
             <a:fld id="{1EF6B16D-0F85-4B82-BE37-4375490CF6D7}" type="datetime1">
               <a:rPr lang="en-US" smtClean="0"/>
               <a:pPr/>
-              <a:t>10/4/2011</a:t>
+              <a:t>10/5/2011</a:t>
             </a:fld>
             <a:endParaRPr lang="en-US"/>
           </a:p>
@@ -5120,7 +5120,7 @@
             <a:fld id="{3B8260AA-179E-4904-9260-BD701E7DDCED}" type="datetime1">
               <a:rPr lang="en-US" smtClean="0"/>
               <a:pPr/>
-              <a:t>10/4/2011</a:t>
+              <a:t>10/5/2011</a:t>
             </a:fld>
             <a:endParaRPr lang="en-US"/>
           </a:p>
@@ -5365,7 +5365,7 @@
             <a:fld id="{9461EBDC-2738-4CF1-9EB6-6C6C624FD79D}" type="datetime1">
               <a:rPr lang="en-US" smtClean="0"/>
               <a:pPr/>
-              <a:t>10/4/2011</a:t>
+              <a:t>10/5/2011</a:t>
             </a:fld>
             <a:endParaRPr lang="en-US"/>
           </a:p>
@@ -5711,7 +5711,7 @@
             <a:fld id="{CEB14723-D31B-4FFF-8BF6-DFD5AD4106D8}" type="datetime1">
               <a:rPr lang="en-US" smtClean="0"/>
               <a:pPr/>
-              <a:t>10/4/2011</a:t>
+              <a:t>10/5/2011</a:t>
             </a:fld>
             <a:endParaRPr lang="en-US" dirty="0"/>
           </a:p>
@@ -5810,7 +5810,7 @@
             <a:fld id="{D7BD04E7-DB2C-44E7-8401-7B2EF877F869}" type="datetime1">
               <a:rPr lang="en-US" smtClean="0"/>
               <a:pPr/>
-              <a:t>10/4/2011</a:t>
+              <a:t>10/5/2011</a:t>
             </a:fld>
             <a:endParaRPr lang="en-US"/>
           </a:p>
@@ -6336,7 +6336,7 @@
             <a:fld id="{E2F01EF0-FFD2-40E1-A32F-9B3627208AC4}" type="datetime1">
               <a:rPr lang="en-US" smtClean="0"/>
               <a:pPr/>
-              <a:t>10/4/2011</a:t>
+              <a:t>10/5/2011</a:t>
             </a:fld>
             <a:endParaRPr lang="en-US"/>
           </a:p>
@@ -6856,7 +6856,7 @@
             <a:fld id="{9F223E29-7B2A-4A6E-8B36-121182E850D1}" type="datetime1">
               <a:rPr lang="en-US" smtClean="0"/>
               <a:pPr/>
-              <a:t>10/4/2011</a:t>
+              <a:t>10/5/2011</a:t>
             </a:fld>
             <a:endParaRPr lang="en-US"/>
           </a:p>
@@ -7007,7 +7007,7 @@
             <a:fld id="{B872EAB8-2209-47FA-91CC-26FE4BDD9545}" type="datetime1">
               <a:rPr lang="en-US" smtClean="0"/>
               <a:pPr/>
-              <a:t>10/4/2011</a:t>
+              <a:t>10/5/2011</a:t>
             </a:fld>
             <a:endParaRPr lang="en-US"/>
           </a:p>
@@ -7204,7 +7204,7 @@
             <a:fld id="{86149588-4A1B-466E-9FB2-229BF8175FE7}" type="datetime1">
               <a:rPr lang="en-US" smtClean="0"/>
               <a:pPr/>
-              <a:t>10/4/2011</a:t>
+              <a:t>10/5/2011</a:t>
             </a:fld>
             <a:endParaRPr lang="en-US"/>
           </a:p>
@@ -7388,7 +7388,7 @@
             <a:fld id="{FC141B0C-D275-49C3-9D1B-58FCB6845F5B}" type="datetime1">
               <a:rPr lang="en-US" smtClean="0"/>
               <a:pPr/>
-              <a:t>10/4/2011</a:t>
+              <a:t>10/5/2011</a:t>
             </a:fld>
             <a:endParaRPr lang="en-US"/>
           </a:p>
@@ -7487,7 +7487,7 @@
             <a:fld id="{85DD8449-C5B7-4117-9FE2-2FE3D08E09ED}" type="datetime1">
               <a:rPr lang="en-US" smtClean="0"/>
               <a:pPr/>
-              <a:t>10/4/2011</a:t>
+              <a:t>10/5/2011</a:t>
             </a:fld>
             <a:endParaRPr lang="en-US"/>
           </a:p>
@@ -7659,7 +7659,7 @@
             <a:fld id="{9EB34B4D-D852-47BD-83B8-7C009639CBA3}" type="datetime1">
               <a:rPr lang="en-US" smtClean="0"/>
               <a:pPr/>
-              <a:t>10/4/2011</a:t>
+              <a:t>10/5/2011</a:t>
             </a:fld>
             <a:endParaRPr lang="en-US"/>
           </a:p>
@@ -8138,7 +8138,7 @@
             <a:fld id="{1C28D42E-A5BC-4278-B5EC-5262A60BD963}" type="datetime1">
               <a:rPr lang="en-US" smtClean="0"/>
               <a:pPr/>
-              <a:t>10/4/2011</a:t>
+              <a:t>10/5/2011</a:t>
             </a:fld>
             <a:endParaRPr lang="en-US"/>
           </a:p>
@@ -8747,7 +8747,7 @@
             <a:fld id="{67091ECE-7262-48AC-8C85-D7D9ECDA6C21}" type="datetime1">
               <a:rPr lang="en-US" smtClean="0"/>
               <a:pPr/>
-              <a:t>10/4/2011</a:t>
+              <a:t>10/5/2011</a:t>
             </a:fld>
             <a:endParaRPr lang="en-US"/>
           </a:p>
@@ -9130,7 +9130,7 @@
             <a:fld id="{7BFC9112-EE29-4F8D-AFF9-49DFC76E3425}" type="datetime1">
               <a:rPr lang="en-US" smtClean="0"/>
               <a:pPr/>
-              <a:t>10/4/2011</a:t>
+              <a:t>10/5/2011</a:t>
             </a:fld>
             <a:endParaRPr lang="en-US"/>
           </a:p>
@@ -9552,7 +9552,7 @@
             <a:fld id="{C572EC97-6D8B-4146-AB4C-B95B539EF4A9}" type="datetime1">
               <a:rPr lang="en-US" smtClean="0"/>
               <a:pPr/>
-              <a:t>10/4/2011</a:t>
+              <a:t>10/5/2011</a:t>
             </a:fld>
             <a:endParaRPr lang="en-US"/>
           </a:p>
@@ -10883,7 +10883,7 @@
             <a:fld id="{11E13247-250B-408B-B25F-68FDDD0AC0E6}" type="datetime1">
               <a:rPr lang="en-US" smtClean="0"/>
               <a:pPr/>
-              <a:t>10/4/2011</a:t>
+              <a:t>10/5/2011</a:t>
             </a:fld>
             <a:endParaRPr lang="en-US"/>
           </a:p>
@@ -11975,7 +11975,7 @@
             <a:fld id="{4372B5CF-8BC2-42B1-8441-5C29F094C339}" type="datetime1">
               <a:rPr lang="en-US" smtClean="0"/>
               <a:pPr/>
-              <a:t>10/4/2011</a:t>
+              <a:t>10/5/2011</a:t>
             </a:fld>
             <a:endParaRPr lang="en-US"/>
           </a:p>
@@ -13162,7 +13162,7 @@
             <a:fld id="{850CA24E-6482-40F0-8089-038E94AA59AB}" type="datetime1">
               <a:rPr lang="en-US" smtClean="0"/>
               <a:pPr/>
-              <a:t>10/4/2011</a:t>
+              <a:t>10/5/2011</a:t>
             </a:fld>
             <a:endParaRPr lang="en-US"/>
           </a:p>
@@ -13982,11 +13982,7 @@
           <a:p>
             <a:r>
               <a:rPr lang="en-US" dirty="0" smtClean="0"/>
-              <a:t>Ontology-based Representation of </a:t>
-            </a:r>
-            <a:r>
-              <a:rPr lang="en-US" dirty="0" smtClean="0"/>
-              <a:t>BLAST web service</a:t>
+              <a:t>Ontology-based Representation of BLAST web service</a:t>
             </a:r>
             <a:endParaRPr lang="en-US" dirty="0"/>
           </a:p>
@@ -14154,6 +14150,205 @@
           <a:noFill/>
         </p:spPr>
       </p:pic>
+      <p:sp>
+        <p:nvSpPr>
+          <p:cNvPr id="5" name="Rectangle 4"/>
+          <p:cNvSpPr/>
+          <p:nvPr/>
+        </p:nvSpPr>
+        <p:spPr>
+          <a:xfrm>
+            <a:off x="4343400" y="2057400"/>
+            <a:ext cx="2133600" cy="2590800"/>
+          </a:xfrm>
+          <a:prstGeom prst="rect">
+            <a:avLst/>
+          </a:prstGeom>
+          <a:noFill/>
+          <a:ln>
+            <a:solidFill>
+              <a:srgbClr val="FE7416"/>
+            </a:solidFill>
+          </a:ln>
+        </p:spPr>
+        <p:style>
+          <a:lnRef idx="2">
+            <a:schemeClr val="accent1">
+              <a:shade val="50000"/>
+            </a:schemeClr>
+          </a:lnRef>
+          <a:fillRef idx="1">
+            <a:schemeClr val="accent1"/>
+          </a:fillRef>
+          <a:effectRef idx="0">
+            <a:schemeClr val="accent1"/>
+          </a:effectRef>
+          <a:fontRef idx="minor">
+            <a:schemeClr val="lt1"/>
+          </a:fontRef>
+        </p:style>
+        <p:txBody>
+          <a:bodyPr rtlCol="0" anchor="ctr"/>
+          <a:lstStyle/>
+          <a:p>
+            <a:pPr algn="ctr"/>
+            <a:endParaRPr lang="en-US"/>
+          </a:p>
+        </p:txBody>
+      </p:sp>
+      <p:grpSp>
+        <p:nvGrpSpPr>
+          <p:cNvPr id="8" name="Group 7"/>
+          <p:cNvGrpSpPr/>
+          <p:nvPr/>
+        </p:nvGrpSpPr>
+        <p:grpSpPr>
+          <a:xfrm>
+            <a:off x="1143000" y="5105400"/>
+            <a:ext cx="4648200" cy="1219200"/>
+            <a:chOff x="1143000" y="5105400"/>
+            <a:chExt cx="4648200" cy="1219200"/>
+          </a:xfrm>
+        </p:grpSpPr>
+        <p:sp>
+          <p:nvSpPr>
+            <p:cNvPr id="6" name="Rectangle 5"/>
+            <p:cNvSpPr/>
+            <p:nvPr/>
+          </p:nvSpPr>
+          <p:spPr>
+            <a:xfrm>
+              <a:off x="4191000" y="5105400"/>
+              <a:ext cx="1600200" cy="838200"/>
+            </a:xfrm>
+            <a:prstGeom prst="rect">
+              <a:avLst/>
+            </a:prstGeom>
+            <a:noFill/>
+            <a:ln>
+              <a:solidFill>
+                <a:srgbClr val="00B050"/>
+              </a:solidFill>
+            </a:ln>
+          </p:spPr>
+          <p:style>
+            <a:lnRef idx="2">
+              <a:schemeClr val="accent1">
+                <a:shade val="50000"/>
+              </a:schemeClr>
+            </a:lnRef>
+            <a:fillRef idx="1">
+              <a:schemeClr val="accent1"/>
+            </a:fillRef>
+            <a:effectRef idx="0">
+              <a:schemeClr val="accent1"/>
+            </a:effectRef>
+            <a:fontRef idx="minor">
+              <a:schemeClr val="lt1"/>
+            </a:fontRef>
+          </p:style>
+          <p:txBody>
+            <a:bodyPr rtlCol="0" anchor="ctr"/>
+            <a:lstStyle/>
+            <a:p>
+              <a:pPr algn="ctr"/>
+              <a:endParaRPr lang="en-US"/>
+            </a:p>
+          </p:txBody>
+        </p:sp>
+        <p:sp>
+          <p:nvSpPr>
+            <p:cNvPr id="7" name="Rectangle 6"/>
+            <p:cNvSpPr/>
+            <p:nvPr/>
+          </p:nvSpPr>
+          <p:spPr>
+            <a:xfrm>
+              <a:off x="1143000" y="5791200"/>
+              <a:ext cx="990600" cy="533400"/>
+            </a:xfrm>
+            <a:prstGeom prst="rect">
+              <a:avLst/>
+            </a:prstGeom>
+            <a:noFill/>
+            <a:ln>
+              <a:solidFill>
+                <a:srgbClr val="00B050"/>
+              </a:solidFill>
+            </a:ln>
+          </p:spPr>
+          <p:style>
+            <a:lnRef idx="2">
+              <a:schemeClr val="accent1">
+                <a:shade val="50000"/>
+              </a:schemeClr>
+            </a:lnRef>
+            <a:fillRef idx="1">
+              <a:schemeClr val="accent1"/>
+            </a:fillRef>
+            <a:effectRef idx="0">
+              <a:schemeClr val="accent1"/>
+            </a:effectRef>
+            <a:fontRef idx="minor">
+              <a:schemeClr val="lt1"/>
+            </a:fontRef>
+          </p:style>
+          <p:txBody>
+            <a:bodyPr rtlCol="0" anchor="ctr"/>
+            <a:lstStyle/>
+            <a:p>
+              <a:pPr algn="ctr"/>
+              <a:endParaRPr lang="en-US"/>
+            </a:p>
+          </p:txBody>
+        </p:sp>
+      </p:grpSp>
+      <p:sp>
+        <p:nvSpPr>
+          <p:cNvPr id="9" name="Rectangle 8"/>
+          <p:cNvSpPr/>
+          <p:nvPr/>
+        </p:nvSpPr>
+        <p:spPr>
+          <a:xfrm>
+            <a:off x="6400800" y="5791200"/>
+            <a:ext cx="1447800" cy="533400"/>
+          </a:xfrm>
+          <a:prstGeom prst="rect">
+            <a:avLst/>
+          </a:prstGeom>
+          <a:noFill/>
+          <a:ln>
+            <a:solidFill>
+              <a:srgbClr val="C00000"/>
+            </a:solidFill>
+          </a:ln>
+        </p:spPr>
+        <p:style>
+          <a:lnRef idx="2">
+            <a:schemeClr val="accent1">
+              <a:shade val="50000"/>
+            </a:schemeClr>
+          </a:lnRef>
+          <a:fillRef idx="1">
+            <a:schemeClr val="accent1"/>
+          </a:fillRef>
+          <a:effectRef idx="0">
+            <a:schemeClr val="accent1"/>
+          </a:effectRef>
+          <a:fontRef idx="minor">
+            <a:schemeClr val="lt1"/>
+          </a:fontRef>
+        </p:style>
+        <p:txBody>
+          <a:bodyPr rtlCol="0" anchor="ctr"/>
+          <a:lstStyle/>
+          <a:p>
+            <a:pPr algn="ctr"/>
+            <a:endParaRPr lang="en-US"/>
+          </a:p>
+        </p:txBody>
+      </p:sp>
     </p:spTree>
   </p:cSld>
   <p:clrMapOvr>
@@ -14162,9 +14357,171 @@
   <p:timing>
     <p:tnLst>
       <p:par>
-        <p:cTn id="1" dur="indefinite" restart="never" nodeType="tmRoot"/>
+        <p:cTn id="1" dur="indefinite" restart="never" nodeType="tmRoot">
+          <p:childTnLst>
+            <p:seq concurrent="1" nextAc="seek">
+              <p:cTn id="2" dur="indefinite" nodeType="mainSeq">
+                <p:childTnLst>
+                  <p:par>
+                    <p:cTn id="3" fill="hold">
+                      <p:stCondLst>
+                        <p:cond delay="indefinite"/>
+                      </p:stCondLst>
+                      <p:childTnLst>
+                        <p:par>
+                          <p:cTn id="4" fill="hold">
+                            <p:stCondLst>
+                              <p:cond delay="0"/>
+                            </p:stCondLst>
+                            <p:childTnLst>
+                              <p:par>
+                                <p:cTn id="5" presetID="1" presetClass="entr" presetSubtype="0" fill="hold" grpId="0" nodeType="clickEffect">
+                                  <p:stCondLst>
+                                    <p:cond delay="0"/>
+                                  </p:stCondLst>
+                                  <p:childTnLst>
+                                    <p:set>
+                                      <p:cBhvr>
+                                        <p:cTn id="6" dur="1" fill="hold">
+                                          <p:stCondLst>
+                                            <p:cond delay="0"/>
+                                          </p:stCondLst>
+                                        </p:cTn>
+                                        <p:tgtEl>
+                                          <p:spTgt spid="5"/>
+                                        </p:tgtEl>
+                                        <p:attrNameLst>
+                                          <p:attrName>style.visibility</p:attrName>
+                                        </p:attrNameLst>
+                                      </p:cBhvr>
+                                      <p:to>
+                                        <p:strVal val="visible"/>
+                                      </p:to>
+                                    </p:set>
+                                  </p:childTnLst>
+                                </p:cTn>
+                              </p:par>
+                            </p:childTnLst>
+                          </p:cTn>
+                        </p:par>
+                      </p:childTnLst>
+                    </p:cTn>
+                  </p:par>
+                  <p:par>
+                    <p:cTn id="7" fill="hold">
+                      <p:stCondLst>
+                        <p:cond delay="indefinite"/>
+                      </p:stCondLst>
+                      <p:childTnLst>
+                        <p:par>
+                          <p:cTn id="8" fill="hold">
+                            <p:stCondLst>
+                              <p:cond delay="0"/>
+                            </p:stCondLst>
+                            <p:childTnLst>
+                              <p:par>
+                                <p:cTn id="9" presetID="1" presetClass="entr" presetSubtype="0" fill="hold" nodeType="clickEffect">
+                                  <p:stCondLst>
+                                    <p:cond delay="0"/>
+                                  </p:stCondLst>
+                                  <p:childTnLst>
+                                    <p:set>
+                                      <p:cBhvr>
+                                        <p:cTn id="10" dur="1" fill="hold">
+                                          <p:stCondLst>
+                                            <p:cond delay="0"/>
+                                          </p:stCondLst>
+                                        </p:cTn>
+                                        <p:tgtEl>
+                                          <p:spTgt spid="8"/>
+                                        </p:tgtEl>
+                                        <p:attrNameLst>
+                                          <p:attrName>style.visibility</p:attrName>
+                                        </p:attrNameLst>
+                                      </p:cBhvr>
+                                      <p:to>
+                                        <p:strVal val="visible"/>
+                                      </p:to>
+                                    </p:set>
+                                  </p:childTnLst>
+                                </p:cTn>
+                              </p:par>
+                            </p:childTnLst>
+                          </p:cTn>
+                        </p:par>
+                      </p:childTnLst>
+                    </p:cTn>
+                  </p:par>
+                  <p:par>
+                    <p:cTn id="11" fill="hold">
+                      <p:stCondLst>
+                        <p:cond delay="indefinite"/>
+                      </p:stCondLst>
+                      <p:childTnLst>
+                        <p:par>
+                          <p:cTn id="12" fill="hold">
+                            <p:stCondLst>
+                              <p:cond delay="0"/>
+                            </p:stCondLst>
+                            <p:childTnLst>
+                              <p:par>
+                                <p:cTn id="13" presetID="1" presetClass="entr" presetSubtype="0" fill="hold" grpId="0" nodeType="clickEffect">
+                                  <p:stCondLst>
+                                    <p:cond delay="0"/>
+                                  </p:stCondLst>
+                                  <p:childTnLst>
+                                    <p:set>
+                                      <p:cBhvr>
+                                        <p:cTn id="14" dur="1" fill="hold">
+                                          <p:stCondLst>
+                                            <p:cond delay="0"/>
+                                          </p:stCondLst>
+                                        </p:cTn>
+                                        <p:tgtEl>
+                                          <p:spTgt spid="9"/>
+                                        </p:tgtEl>
+                                        <p:attrNameLst>
+                                          <p:attrName>style.visibility</p:attrName>
+                                        </p:attrNameLst>
+                                      </p:cBhvr>
+                                      <p:to>
+                                        <p:strVal val="visible"/>
+                                      </p:to>
+                                    </p:set>
+                                  </p:childTnLst>
+                                </p:cTn>
+                              </p:par>
+                            </p:childTnLst>
+                          </p:cTn>
+                        </p:par>
+                      </p:childTnLst>
+                    </p:cTn>
+                  </p:par>
+                </p:childTnLst>
+              </p:cTn>
+              <p:prevCondLst>
+                <p:cond evt="onPrev" delay="0">
+                  <p:tgtEl>
+                    <p:sldTgt/>
+                  </p:tgtEl>
+                </p:cond>
+              </p:prevCondLst>
+              <p:nextCondLst>
+                <p:cond evt="onNext" delay="0">
+                  <p:tgtEl>
+                    <p:sldTgt/>
+                  </p:tgtEl>
+                </p:cond>
+              </p:nextCondLst>
+            </p:seq>
+          </p:childTnLst>
+        </p:cTn>
       </p:par>
     </p:tnLst>
+    <p:bldLst>
+      <p:bldP spid="5" grpId="0" animBg="1"/>
+      <p:bldP spid="9" grpId="0" animBg="1"/>
+    </p:bldLst>
   </p:timing>
 </p:sld>
 </file>
@@ -14203,11 +14560,7 @@
           <a:p>
             <a:r>
               <a:rPr lang="en-US" dirty="0" smtClean="0"/>
-              <a:t>Ontology-based Representation of </a:t>
-            </a:r>
-            <a:r>
-              <a:rPr lang="en-US" dirty="0" smtClean="0"/>
-              <a:t>‘BLAST analysis’</a:t>
+              <a:t>Ontology-based Representation of ‘BLAST analysis’</a:t>
             </a:r>
             <a:endParaRPr lang="en-US" dirty="0"/>
           </a:p>
@@ -17585,7 +17938,7 @@
       </p:sp>
       <p:pic>
         <p:nvPicPr>
-          <p:cNvPr id="1026" name="Picture 2"/>
+          <p:cNvPr id="5" name="Picture 2"/>
           <p:cNvPicPr>
             <a:picLocks noChangeAspect="1" noChangeArrowheads="1"/>
           </p:cNvPicPr>
@@ -17600,8 +17953,8 @@
         </p:blipFill>
         <p:spPr bwMode="auto">
           <a:xfrm>
-            <a:off x="243400" y="1676400"/>
-            <a:ext cx="8367200" cy="4495800"/>
+            <a:off x="319599" y="1600200"/>
+            <a:ext cx="8367201" cy="4495800"/>
           </a:xfrm>
           <a:prstGeom prst="rect">
             <a:avLst/>
@@ -17621,6 +17974,13 @@
   <p:clrMapOvr>
     <a:masterClrMapping/>
   </p:clrMapOvr>
+  <p:timing>
+    <p:tnLst>
+      <p:par>
+        <p:cTn id="1" dur="indefinite" restart="never" nodeType="tmRoot"/>
+      </p:par>
+    </p:tnLst>
+  </p:timing>
 </p:sld>
 </file>
 
@@ -17692,27 +18052,7 @@
             </a:r>
             <a:r>
               <a:rPr lang="en-US" dirty="0" smtClean="0"/>
-              <a:t>: a plan specification that contains a set of </a:t>
-            </a:r>
-            <a:r>
-              <a:rPr lang="en-US" dirty="0" smtClean="0"/>
-              <a:t>instructions, </a:t>
-            </a:r>
-            <a:r>
-              <a:rPr lang="en-US" dirty="0" smtClean="0"/>
-              <a:t>independent of implementation </a:t>
-            </a:r>
-            <a:r>
-              <a:rPr lang="en-US" dirty="0" smtClean="0"/>
-              <a:t>and </a:t>
-            </a:r>
-            <a:r>
-              <a:rPr lang="en-US" dirty="0" smtClean="0"/>
-              <a:t>programming </a:t>
-            </a:r>
-            <a:r>
-              <a:rPr lang="en-US" dirty="0" smtClean="0"/>
-              <a:t>languages.</a:t>
+              <a:t>: a plan specification that contains a set of instructions, independent of implementation and programming languages.</a:t>
             </a:r>
           </a:p>
           <a:p>
@@ -17735,23 +18075,7 @@
             </a:pPr>
             <a:r>
               <a:rPr lang="en-US" dirty="0" smtClean="0"/>
-              <a:t>	We </a:t>
-            </a:r>
-            <a:r>
-              <a:rPr lang="en-US" dirty="0" smtClean="0"/>
-              <a:t>propose its reverse relation as ‘</a:t>
-            </a:r>
-            <a:r>
-              <a:rPr lang="en-US" dirty="0" smtClean="0"/>
-              <a:t>encodes</a:t>
-            </a:r>
-            <a:r>
-              <a:rPr lang="en-US" dirty="0" smtClean="0"/>
-              <a:t>’.</a:t>
-            </a:r>
-            <a:r>
-              <a:rPr lang="en-US" dirty="0" smtClean="0"/>
-              <a:t> </a:t>
+              <a:t>	We propose its reverse relation as ‘encodes’. </a:t>
             </a:r>
           </a:p>
           <a:p>
@@ -17761,23 +18085,7 @@
             </a:r>
             <a:r>
               <a:rPr lang="en-US" dirty="0" smtClean="0"/>
-              <a:t>: a </a:t>
-            </a:r>
-            <a:r>
-              <a:rPr lang="en-US" dirty="0" smtClean="0"/>
-              <a:t>plan specification that </a:t>
-            </a:r>
-            <a:r>
-              <a:rPr lang="en-US" dirty="0" smtClean="0"/>
-              <a:t>implements (encodes) </a:t>
-            </a:r>
-            <a:r>
-              <a:rPr lang="en-US" dirty="0" smtClean="0"/>
-              <a:t>one or more algorithms in one or more programming languages</a:t>
-            </a:r>
-            <a:r>
-              <a:rPr lang="en-US" dirty="0" smtClean="0"/>
-              <a:t>.</a:t>
+              <a:t>: a plan specification that implements (encodes) one or more algorithms in one or more programming languages.</a:t>
             </a:r>
           </a:p>
           <a:p>
@@ -17789,7 +18097,6 @@
               <a:rPr lang="en-US" dirty="0" smtClean="0"/>
               <a:t>: a planned process that executes software. </a:t>
             </a:r>
-            <a:endParaRPr lang="en-US" dirty="0" smtClean="0"/>
           </a:p>
           <a:p>
             <a:pPr lvl="1"/>
@@ -17805,10 +18112,6 @@
             <a:r>
               <a:rPr lang="en-US" dirty="0" smtClean="0"/>
               <a:t>    We propose its reverse relation as ‘executes’.</a:t>
-            </a:r>
-            <a:r>
-              <a:rPr lang="en-US" dirty="0" smtClean="0"/>
-              <a:t/>
             </a:r>
             <a:br>
               <a:rPr lang="en-US" dirty="0" smtClean="0"/>

</xml_diff>